<commit_message>
Updated with new plots
</commit_message>
<xml_diff>
--- a/figs/sys-arch.pptx
+++ b/figs/sys-arch.pptx
@@ -3138,28 +3138,25 @@
           <a:p>
             <a:pPr algn="ctr"/>
             <a:r>
-              <a:rPr lang="en-US" sz="1200" dirty="0" smtClean="0">
+              <a:rPr lang="en-US" sz="1500" dirty="0" smtClean="0">
                 <a:solidFill>
                   <a:schemeClr val="tx1"/>
                 </a:solidFill>
-                <a:latin typeface="Helvetica Neue"/>
-                <a:cs typeface="Helvetica Neue"/>
+                <a:latin typeface="Helvetica Light"/>
+                <a:cs typeface="Helvetica Light"/>
               </a:rPr>
               <a:t>Stale View</a:t>
             </a:r>
           </a:p>
           <a:p>
             <a:pPr algn="ctr"/>
-            <a:r>
-              <a:rPr lang="en-US" sz="1200" dirty="0">
-                <a:solidFill>
-                  <a:schemeClr val="tx1"/>
-                </a:solidFill>
-                <a:latin typeface="Helvetica Neue"/>
-                <a:cs typeface="Helvetica Neue"/>
-              </a:rPr>
-              <a:t>S</a:t>
-            </a:r>
+            <a:endParaRPr lang="en-US" sz="1500" dirty="0">
+              <a:solidFill>
+                <a:schemeClr val="tx1"/>
+              </a:solidFill>
+              <a:latin typeface="Helvetica Light"/>
+              <a:cs typeface="Helvetica Light"/>
+            </a:endParaRPr>
           </a:p>
         </p:txBody>
       </p:sp>
@@ -3206,34 +3203,24 @@
           <a:p>
             <a:pPr algn="ctr"/>
             <a:r>
-              <a:rPr lang="en-US" sz="1200" dirty="0" smtClean="0">
+              <a:rPr lang="en-US" sz="1500" dirty="0" smtClean="0">
                 <a:solidFill>
                   <a:schemeClr val="tx1"/>
                 </a:solidFill>
-                <a:latin typeface="Helvetica Neue"/>
-                <a:cs typeface="Helvetica Neue"/>
+                <a:latin typeface="Helvetica Light"/>
+                <a:cs typeface="Helvetica Light"/>
               </a:rPr>
               <a:t>Fresh View</a:t>
             </a:r>
           </a:p>
           <a:p>
             <a:pPr algn="ctr"/>
-            <a:r>
-              <a:rPr lang="en-US" sz="1200" dirty="0" smtClean="0">
-                <a:solidFill>
-                  <a:schemeClr val="tx1"/>
-                </a:solidFill>
-                <a:latin typeface="Helvetica Neue"/>
-                <a:cs typeface="Helvetica Neue"/>
-              </a:rPr>
-              <a:t>S’</a:t>
-            </a:r>
-            <a:endParaRPr lang="en-US" sz="1200" dirty="0">
+            <a:endParaRPr lang="en-US" sz="1500" dirty="0">
               <a:solidFill>
                 <a:schemeClr val="tx1"/>
               </a:solidFill>
-              <a:latin typeface="Helvetica Neue"/>
-              <a:cs typeface="Helvetica Neue"/>
+              <a:latin typeface="Helvetica Light"/>
+              <a:cs typeface="Helvetica Light"/>
             </a:endParaRPr>
           </a:p>
         </p:txBody>
@@ -3309,8 +3296,8 @@
         </p:nvSpPr>
         <p:spPr>
           <a:xfrm>
-            <a:off x="3859940" y="4406900"/>
-            <a:ext cx="1678121" cy="461665"/>
+            <a:off x="3670515" y="4406900"/>
+            <a:ext cx="2056973" cy="553998"/>
           </a:xfrm>
           <a:prstGeom prst="rect">
             <a:avLst/>
@@ -3325,9 +3312,9 @@
           <a:p>
             <a:pPr algn="ctr"/>
             <a:r>
-              <a:rPr lang="en-US" sz="1200" dirty="0" smtClean="0">
-                <a:latin typeface="Helvetica Neue"/>
-                <a:cs typeface="Helvetica Neue"/>
+              <a:rPr lang="en-US" sz="1500" dirty="0" smtClean="0">
+                <a:latin typeface="Helvetica Light"/>
+                <a:cs typeface="Helvetica Light"/>
               </a:rPr>
               <a:t>Background</a:t>
             </a:r>
@@ -3335,15 +3322,15 @@
           <a:p>
             <a:pPr algn="ctr"/>
             <a:r>
-              <a:rPr lang="en-US" sz="1200" dirty="0" smtClean="0">
-                <a:latin typeface="Helvetica Neue"/>
-                <a:cs typeface="Helvetica Neue"/>
+              <a:rPr lang="en-US" sz="1500" dirty="0" smtClean="0">
+                <a:latin typeface="Helvetica Light"/>
+                <a:cs typeface="Helvetica Light"/>
               </a:rPr>
               <a:t>Periodic Maintenance</a:t>
             </a:r>
-            <a:endParaRPr lang="en-US" sz="1200" dirty="0">
-              <a:latin typeface="Helvetica Neue"/>
-              <a:cs typeface="Helvetica Neue"/>
+            <a:endParaRPr lang="en-US" sz="1500" dirty="0">
+              <a:latin typeface="Helvetica Light"/>
+              <a:cs typeface="Helvetica Light"/>
             </a:endParaRPr>
           </a:p>
         </p:txBody>
@@ -3390,9 +3377,9 @@
           <a:lstStyle/>
           <a:p>
             <a:pPr algn="ctr"/>
-            <a:endParaRPr lang="en-US" sz="1200">
-              <a:latin typeface="Helvetica Neue"/>
-              <a:cs typeface="Helvetica Neue"/>
+            <a:endParaRPr lang="en-US" sz="1500">
+              <a:latin typeface="Helvetica Light"/>
+              <a:cs typeface="Helvetica Light"/>
             </a:endParaRPr>
           </a:p>
         </p:txBody>
@@ -3439,9 +3426,9 @@
           <a:lstStyle/>
           <a:p>
             <a:pPr algn="ctr"/>
-            <a:endParaRPr lang="en-US" sz="1200">
-              <a:latin typeface="Helvetica Neue"/>
-              <a:cs typeface="Helvetica Neue"/>
+            <a:endParaRPr lang="en-US" sz="1500">
+              <a:latin typeface="Helvetica Light"/>
+              <a:cs typeface="Helvetica Light"/>
             </a:endParaRPr>
           </a:p>
         </p:txBody>
@@ -3488,9 +3475,9 @@
           <a:lstStyle/>
           <a:p>
             <a:pPr algn="ctr"/>
-            <a:endParaRPr lang="en-US" sz="1200">
-              <a:latin typeface="Helvetica Neue"/>
-              <a:cs typeface="Helvetica Neue"/>
+            <a:endParaRPr lang="en-US" sz="1500">
+              <a:latin typeface="Helvetica Light"/>
+              <a:cs typeface="Helvetica Light"/>
             </a:endParaRPr>
           </a:p>
         </p:txBody>
@@ -3504,7 +3491,7 @@
         <p:spPr>
           <a:xfrm>
             <a:off x="4223632" y="5308600"/>
-            <a:ext cx="902811" cy="276999"/>
+            <a:ext cx="1082792" cy="323165"/>
           </a:xfrm>
           <a:prstGeom prst="rect">
             <a:avLst/>
@@ -3518,15 +3505,15 @@
           <a:lstStyle/>
           <a:p>
             <a:r>
-              <a:rPr lang="en-US" sz="1200" dirty="0" smtClean="0">
-                <a:latin typeface="Helvetica Neue"/>
-                <a:cs typeface="Helvetica Neue"/>
+              <a:rPr lang="en-US" sz="1500" dirty="0" smtClean="0">
+                <a:latin typeface="Helvetica Light"/>
+                <a:cs typeface="Helvetica Light"/>
               </a:rPr>
               <a:t>Base Data</a:t>
             </a:r>
-            <a:endParaRPr lang="en-US" sz="1200" dirty="0">
-              <a:latin typeface="Helvetica Neue"/>
-              <a:cs typeface="Helvetica Neue"/>
+            <a:endParaRPr lang="en-US" sz="1500" dirty="0">
+              <a:latin typeface="Helvetica Light"/>
+              <a:cs typeface="Helvetica Light"/>
             </a:endParaRPr>
           </a:p>
         </p:txBody>
@@ -3651,9 +3638,9 @@
           <a:lstStyle/>
           <a:p>
             <a:pPr algn="ctr"/>
-            <a:endParaRPr lang="en-US" sz="1200" dirty="0">
-              <a:latin typeface="Helvetica Neue"/>
-              <a:cs typeface="Helvetica Neue"/>
+            <a:endParaRPr lang="en-US" sz="1500" dirty="0">
+              <a:latin typeface="Helvetica Light"/>
+              <a:cs typeface="Helvetica Light"/>
             </a:endParaRPr>
           </a:p>
         </p:txBody>
@@ -3667,7 +3654,7 @@
         <p:spPr>
           <a:xfrm>
             <a:off x="1406207" y="1295400"/>
-            <a:ext cx="646331" cy="369332"/>
+            <a:ext cx="558609" cy="323165"/>
           </a:xfrm>
           <a:prstGeom prst="rect">
             <a:avLst/>
@@ -3681,15 +3668,15 @@
           <a:lstStyle/>
           <a:p>
             <a:r>
-              <a:rPr lang="en-US" dirty="0" smtClean="0">
-                <a:latin typeface="Helvetica Neue"/>
-                <a:cs typeface="Helvetica Neue"/>
+              <a:rPr lang="en-US" sz="1500" dirty="0" smtClean="0">
+                <a:latin typeface="Helvetica Light"/>
+                <a:cs typeface="Helvetica Light"/>
               </a:rPr>
               <a:t>SVC</a:t>
             </a:r>
-            <a:endParaRPr lang="en-US" dirty="0">
-              <a:latin typeface="Helvetica Neue"/>
-              <a:cs typeface="Helvetica Neue"/>
+            <a:endParaRPr lang="en-US" sz="1500" dirty="0">
+              <a:latin typeface="Helvetica Light"/>
+              <a:cs typeface="Helvetica Light"/>
             </a:endParaRPr>
           </a:p>
         </p:txBody>
@@ -3818,12 +3805,12 @@
           <a:p>
             <a:pPr algn="ctr"/>
             <a:r>
-              <a:rPr lang="en-US" sz="1200" dirty="0" smtClean="0">
+              <a:rPr lang="en-US" sz="1500" dirty="0" smtClean="0">
                 <a:solidFill>
                   <a:schemeClr val="tx1"/>
                 </a:solidFill>
-                <a:latin typeface="Helvetica Neue"/>
-                <a:cs typeface="Helvetica Neue"/>
+                <a:latin typeface="Helvetica Light"/>
+                <a:cs typeface="Helvetica Light"/>
               </a:rPr>
               <a:t>Fresh</a:t>
             </a:r>
@@ -3831,12 +3818,12 @@
           <a:p>
             <a:pPr algn="ctr"/>
             <a:r>
-              <a:rPr lang="en-US" sz="1200" dirty="0" smtClean="0">
+              <a:rPr lang="en-US" sz="1500" dirty="0" smtClean="0">
                 <a:solidFill>
                   <a:schemeClr val="tx1"/>
                 </a:solidFill>
-                <a:latin typeface="Helvetica Neue"/>
-                <a:cs typeface="Helvetica Neue"/>
+                <a:latin typeface="Helvetica Light"/>
+                <a:cs typeface="Helvetica Light"/>
               </a:rPr>
               <a:t>Sample View</a:t>
             </a:r>
@@ -3851,8 +3838,8 @@
         </p:nvSpPr>
         <p:spPr>
           <a:xfrm>
-            <a:off x="3858371" y="2364938"/>
-            <a:ext cx="1635653" cy="461665"/>
+            <a:off x="3675161" y="2364938"/>
+            <a:ext cx="2002074" cy="553998"/>
           </a:xfrm>
           <a:prstGeom prst="rect">
             <a:avLst/>
@@ -3867,9 +3854,9 @@
           <a:p>
             <a:pPr algn="ctr"/>
             <a:r>
-              <a:rPr lang="en-US" sz="1200" dirty="0" smtClean="0">
-                <a:latin typeface="Helvetica Neue"/>
-                <a:cs typeface="Helvetica Neue"/>
+              <a:rPr lang="en-US" sz="1500" dirty="0" smtClean="0">
+                <a:latin typeface="Helvetica Light"/>
+                <a:cs typeface="Helvetica Light"/>
               </a:rPr>
               <a:t>Real-time Efficient </a:t>
             </a:r>
@@ -3877,15 +3864,15 @@
           <a:p>
             <a:pPr algn="ctr"/>
             <a:r>
-              <a:rPr lang="en-US" sz="1200" dirty="0" smtClean="0">
-                <a:latin typeface="Helvetica Neue"/>
-                <a:cs typeface="Helvetica Neue"/>
+              <a:rPr lang="en-US" sz="1500" dirty="0" smtClean="0">
+                <a:latin typeface="Helvetica Light"/>
+                <a:cs typeface="Helvetica Light"/>
               </a:rPr>
               <a:t>Sample Maintenance</a:t>
             </a:r>
-            <a:endParaRPr lang="en-US" sz="1200" dirty="0">
-              <a:latin typeface="Helvetica Neue"/>
-              <a:cs typeface="Helvetica Neue"/>
+            <a:endParaRPr lang="en-US" sz="1500" dirty="0">
+              <a:latin typeface="Helvetica Light"/>
+              <a:cs typeface="Helvetica Light"/>
             </a:endParaRPr>
           </a:p>
         </p:txBody>
@@ -3899,7 +3886,7 @@
         <p:spPr>
           <a:xfrm>
             <a:off x="3754425" y="578703"/>
-            <a:ext cx="598006" cy="276999"/>
+            <a:ext cx="710451" cy="323165"/>
           </a:xfrm>
           <a:prstGeom prst="rect">
             <a:avLst/>
@@ -3913,15 +3900,15 @@
           <a:lstStyle/>
           <a:p>
             <a:r>
-              <a:rPr lang="en-US" sz="1200" dirty="0" smtClean="0">
-                <a:latin typeface="Helvetica Neue"/>
-                <a:cs typeface="Helvetica Neue"/>
+              <a:rPr lang="en-US" sz="1500" dirty="0" smtClean="0">
+                <a:latin typeface="Helvetica Light"/>
+                <a:cs typeface="Helvetica Light"/>
               </a:rPr>
               <a:t>Query</a:t>
             </a:r>
-            <a:endParaRPr lang="en-US" sz="1200" dirty="0">
-              <a:latin typeface="Helvetica Neue"/>
-              <a:cs typeface="Helvetica Neue"/>
+            <a:endParaRPr lang="en-US" sz="1500" dirty="0">
+              <a:latin typeface="Helvetica Light"/>
+              <a:cs typeface="Helvetica Light"/>
             </a:endParaRPr>
           </a:p>
         </p:txBody>
@@ -3970,8 +3957,8 @@
         </p:nvSpPr>
         <p:spPr>
           <a:xfrm>
-            <a:off x="4742134" y="360402"/>
-            <a:ext cx="1062581" cy="646331"/>
+            <a:off x="4629658" y="360402"/>
+            <a:ext cx="1287532" cy="784830"/>
           </a:xfrm>
           <a:prstGeom prst="rect">
             <a:avLst/>
@@ -3986,9 +3973,9 @@
           <a:p>
             <a:pPr algn="ctr"/>
             <a:r>
-              <a:rPr lang="en-US" sz="1200" dirty="0" smtClean="0">
-                <a:latin typeface="Helvetica Neue"/>
-                <a:cs typeface="Helvetica Neue"/>
+              <a:rPr lang="en-US" sz="1500" dirty="0" smtClean="0">
+                <a:latin typeface="Helvetica Light"/>
+                <a:cs typeface="Helvetica Light"/>
               </a:rPr>
               <a:t>Fresh</a:t>
             </a:r>
@@ -3996,9 +3983,9 @@
           <a:p>
             <a:pPr algn="ctr"/>
             <a:r>
-              <a:rPr lang="en-US" sz="1200" dirty="0" smtClean="0">
-                <a:latin typeface="Helvetica Neue"/>
-                <a:cs typeface="Helvetica Neue"/>
+              <a:rPr lang="en-US" sz="1500" dirty="0" smtClean="0">
+                <a:latin typeface="Helvetica Light"/>
+                <a:cs typeface="Helvetica Light"/>
               </a:rPr>
               <a:t>Approximate </a:t>
             </a:r>
@@ -4006,15 +3993,15 @@
           <a:p>
             <a:pPr algn="ctr"/>
             <a:r>
-              <a:rPr lang="en-US" sz="1200" dirty="0" smtClean="0">
-                <a:latin typeface="Helvetica Neue"/>
-                <a:cs typeface="Helvetica Neue"/>
+              <a:rPr lang="en-US" sz="1500" dirty="0" smtClean="0">
+                <a:latin typeface="Helvetica Light"/>
+                <a:cs typeface="Helvetica Light"/>
               </a:rPr>
               <a:t>Result</a:t>
             </a:r>
-            <a:endParaRPr lang="en-US" sz="1200" dirty="0">
-              <a:latin typeface="Helvetica Neue"/>
-              <a:cs typeface="Helvetica Neue"/>
+            <a:endParaRPr lang="en-US" sz="1500" dirty="0">
+              <a:latin typeface="Helvetica Light"/>
+              <a:cs typeface="Helvetica Light"/>
             </a:endParaRPr>
           </a:p>
         </p:txBody>
@@ -4098,12 +4085,12 @@
           <a:p>
             <a:pPr algn="ctr"/>
             <a:r>
-              <a:rPr lang="en-US" sz="1200" dirty="0" smtClean="0">
+              <a:rPr lang="en-US" sz="1500" dirty="0" smtClean="0">
                 <a:solidFill>
                   <a:schemeClr val="tx1"/>
                 </a:solidFill>
-                <a:latin typeface="Helvetica Neue"/>
-                <a:cs typeface="Helvetica Neue"/>
+                <a:latin typeface="Helvetica Light"/>
+                <a:cs typeface="Helvetica Light"/>
               </a:rPr>
               <a:t>Outlier Index</a:t>
             </a:r>

</xml_diff>

<commit_message>
Small change to the intro image and the outlier section
</commit_message>
<xml_diff>
--- a/figs/sys-arch.pptx
+++ b/figs/sys-arch.pptx
@@ -288,7 +288,7 @@
           <a:p>
             <a:fld id="{47660027-B21B-AE43-90FC-390727F2EBA0}" type="datetimeFigureOut">
               <a:rPr lang="en-US" smtClean="0"/>
-              <a:t>11/14/14</a:t>
+              <a:t>12/2/14</a:t>
             </a:fld>
             <a:endParaRPr lang="en-US"/>
           </a:p>
@@ -458,7 +458,7 @@
           <a:p>
             <a:fld id="{47660027-B21B-AE43-90FC-390727F2EBA0}" type="datetimeFigureOut">
               <a:rPr lang="en-US" smtClean="0"/>
-              <a:t>11/14/14</a:t>
+              <a:t>12/2/14</a:t>
             </a:fld>
             <a:endParaRPr lang="en-US"/>
           </a:p>
@@ -638,7 +638,7 @@
           <a:p>
             <a:fld id="{47660027-B21B-AE43-90FC-390727F2EBA0}" type="datetimeFigureOut">
               <a:rPr lang="en-US" smtClean="0"/>
-              <a:t>11/14/14</a:t>
+              <a:t>12/2/14</a:t>
             </a:fld>
             <a:endParaRPr lang="en-US"/>
           </a:p>
@@ -808,7 +808,7 @@
           <a:p>
             <a:fld id="{47660027-B21B-AE43-90FC-390727F2EBA0}" type="datetimeFigureOut">
               <a:rPr lang="en-US" smtClean="0"/>
-              <a:t>11/14/14</a:t>
+              <a:t>12/2/14</a:t>
             </a:fld>
             <a:endParaRPr lang="en-US"/>
           </a:p>
@@ -1054,7 +1054,7 @@
           <a:p>
             <a:fld id="{47660027-B21B-AE43-90FC-390727F2EBA0}" type="datetimeFigureOut">
               <a:rPr lang="en-US" smtClean="0"/>
-              <a:t>11/14/14</a:t>
+              <a:t>12/2/14</a:t>
             </a:fld>
             <a:endParaRPr lang="en-US"/>
           </a:p>
@@ -1342,7 +1342,7 @@
           <a:p>
             <a:fld id="{47660027-B21B-AE43-90FC-390727F2EBA0}" type="datetimeFigureOut">
               <a:rPr lang="en-US" smtClean="0"/>
-              <a:t>11/14/14</a:t>
+              <a:t>12/2/14</a:t>
             </a:fld>
             <a:endParaRPr lang="en-US"/>
           </a:p>
@@ -1764,7 +1764,7 @@
           <a:p>
             <a:fld id="{47660027-B21B-AE43-90FC-390727F2EBA0}" type="datetimeFigureOut">
               <a:rPr lang="en-US" smtClean="0"/>
-              <a:t>11/14/14</a:t>
+              <a:t>12/2/14</a:t>
             </a:fld>
             <a:endParaRPr lang="en-US"/>
           </a:p>
@@ -1882,7 +1882,7 @@
           <a:p>
             <a:fld id="{47660027-B21B-AE43-90FC-390727F2EBA0}" type="datetimeFigureOut">
               <a:rPr lang="en-US" smtClean="0"/>
-              <a:t>11/14/14</a:t>
+              <a:t>12/2/14</a:t>
             </a:fld>
             <a:endParaRPr lang="en-US"/>
           </a:p>
@@ -1977,7 +1977,7 @@
           <a:p>
             <a:fld id="{47660027-B21B-AE43-90FC-390727F2EBA0}" type="datetimeFigureOut">
               <a:rPr lang="en-US" smtClean="0"/>
-              <a:t>11/14/14</a:t>
+              <a:t>12/2/14</a:t>
             </a:fld>
             <a:endParaRPr lang="en-US"/>
           </a:p>
@@ -2254,7 +2254,7 @@
           <a:p>
             <a:fld id="{47660027-B21B-AE43-90FC-390727F2EBA0}" type="datetimeFigureOut">
               <a:rPr lang="en-US" smtClean="0"/>
-              <a:t>11/14/14</a:t>
+              <a:t>12/2/14</a:t>
             </a:fld>
             <a:endParaRPr lang="en-US"/>
           </a:p>
@@ -2507,7 +2507,7 @@
           <a:p>
             <a:fld id="{47660027-B21B-AE43-90FC-390727F2EBA0}" type="datetimeFigureOut">
               <a:rPr lang="en-US" smtClean="0"/>
-              <a:t>11/14/14</a:t>
+              <a:t>12/2/14</a:t>
             </a:fld>
             <a:endParaRPr lang="en-US"/>
           </a:p>
@@ -2720,7 +2720,7 @@
           <a:p>
             <a:fld id="{47660027-B21B-AE43-90FC-390727F2EBA0}" type="datetimeFigureOut">
               <a:rPr lang="en-US" smtClean="0"/>
-              <a:t>11/14/14</a:t>
+              <a:t>12/2/14</a:t>
             </a:fld>
             <a:endParaRPr lang="en-US"/>
           </a:p>
@@ -3957,7 +3957,7 @@
         </p:nvSpPr>
         <p:spPr>
           <a:xfrm>
-            <a:off x="4629658" y="360402"/>
+            <a:off x="4629658" y="105437"/>
             <a:ext cx="1287532" cy="784830"/>
           </a:xfrm>
           <a:prstGeom prst="rect">

</xml_diff>

<commit_message>
Updated plots and some tex fixes
</commit_message>
<xml_diff>
--- a/figs/sys-arch.pptx
+++ b/figs/sys-arch.pptx
@@ -288,7 +288,7 @@
           <a:p>
             <a:fld id="{47660027-B21B-AE43-90FC-390727F2EBA0}" type="datetimeFigureOut">
               <a:rPr lang="en-US" smtClean="0"/>
-              <a:t>12/2/14</a:t>
+              <a:t>12/20/14</a:t>
             </a:fld>
             <a:endParaRPr lang="en-US"/>
           </a:p>
@@ -458,7 +458,7 @@
           <a:p>
             <a:fld id="{47660027-B21B-AE43-90FC-390727F2EBA0}" type="datetimeFigureOut">
               <a:rPr lang="en-US" smtClean="0"/>
-              <a:t>12/2/14</a:t>
+              <a:t>12/20/14</a:t>
             </a:fld>
             <a:endParaRPr lang="en-US"/>
           </a:p>
@@ -638,7 +638,7 @@
           <a:p>
             <a:fld id="{47660027-B21B-AE43-90FC-390727F2EBA0}" type="datetimeFigureOut">
               <a:rPr lang="en-US" smtClean="0"/>
-              <a:t>12/2/14</a:t>
+              <a:t>12/20/14</a:t>
             </a:fld>
             <a:endParaRPr lang="en-US"/>
           </a:p>
@@ -808,7 +808,7 @@
           <a:p>
             <a:fld id="{47660027-B21B-AE43-90FC-390727F2EBA0}" type="datetimeFigureOut">
               <a:rPr lang="en-US" smtClean="0"/>
-              <a:t>12/2/14</a:t>
+              <a:t>12/20/14</a:t>
             </a:fld>
             <a:endParaRPr lang="en-US"/>
           </a:p>
@@ -1054,7 +1054,7 @@
           <a:p>
             <a:fld id="{47660027-B21B-AE43-90FC-390727F2EBA0}" type="datetimeFigureOut">
               <a:rPr lang="en-US" smtClean="0"/>
-              <a:t>12/2/14</a:t>
+              <a:t>12/20/14</a:t>
             </a:fld>
             <a:endParaRPr lang="en-US"/>
           </a:p>
@@ -1342,7 +1342,7 @@
           <a:p>
             <a:fld id="{47660027-B21B-AE43-90FC-390727F2EBA0}" type="datetimeFigureOut">
               <a:rPr lang="en-US" smtClean="0"/>
-              <a:t>12/2/14</a:t>
+              <a:t>12/20/14</a:t>
             </a:fld>
             <a:endParaRPr lang="en-US"/>
           </a:p>
@@ -1764,7 +1764,7 @@
           <a:p>
             <a:fld id="{47660027-B21B-AE43-90FC-390727F2EBA0}" type="datetimeFigureOut">
               <a:rPr lang="en-US" smtClean="0"/>
-              <a:t>12/2/14</a:t>
+              <a:t>12/20/14</a:t>
             </a:fld>
             <a:endParaRPr lang="en-US"/>
           </a:p>
@@ -1882,7 +1882,7 @@
           <a:p>
             <a:fld id="{47660027-B21B-AE43-90FC-390727F2EBA0}" type="datetimeFigureOut">
               <a:rPr lang="en-US" smtClean="0"/>
-              <a:t>12/2/14</a:t>
+              <a:t>12/20/14</a:t>
             </a:fld>
             <a:endParaRPr lang="en-US"/>
           </a:p>
@@ -1977,7 +1977,7 @@
           <a:p>
             <a:fld id="{47660027-B21B-AE43-90FC-390727F2EBA0}" type="datetimeFigureOut">
               <a:rPr lang="en-US" smtClean="0"/>
-              <a:t>12/2/14</a:t>
+              <a:t>12/20/14</a:t>
             </a:fld>
             <a:endParaRPr lang="en-US"/>
           </a:p>
@@ -2254,7 +2254,7 @@
           <a:p>
             <a:fld id="{47660027-B21B-AE43-90FC-390727F2EBA0}" type="datetimeFigureOut">
               <a:rPr lang="en-US" smtClean="0"/>
-              <a:t>12/2/14</a:t>
+              <a:t>12/20/14</a:t>
             </a:fld>
             <a:endParaRPr lang="en-US"/>
           </a:p>
@@ -2507,7 +2507,7 @@
           <a:p>
             <a:fld id="{47660027-B21B-AE43-90FC-390727F2EBA0}" type="datetimeFigureOut">
               <a:rPr lang="en-US" smtClean="0"/>
-              <a:t>12/2/14</a:t>
+              <a:t>12/20/14</a:t>
             </a:fld>
             <a:endParaRPr lang="en-US"/>
           </a:p>
@@ -2720,7 +2720,7 @@
           <a:p>
             <a:fld id="{47660027-B21B-AE43-90FC-390727F2EBA0}" type="datetimeFigureOut">
               <a:rPr lang="en-US" smtClean="0"/>
-              <a:t>12/2/14</a:t>
+              <a:t>12/20/14</a:t>
             </a:fld>
             <a:endParaRPr lang="en-US"/>
           </a:p>
@@ -3095,1008 +3095,1047 @@
           <a:chExt cx="0" cy="0"/>
         </a:xfrm>
       </p:grpSpPr>
-      <p:sp>
-        <p:nvSpPr>
-          <p:cNvPr id="5" name="Rectangle 4"/>
-          <p:cNvSpPr/>
+      <p:grpSp>
+        <p:nvGrpSpPr>
+          <p:cNvPr id="2" name="Group 1"/>
+          <p:cNvGrpSpPr/>
           <p:nvPr/>
-        </p:nvSpPr>
-        <p:spPr>
+        </p:nvGrpSpPr>
+        <p:grpSpPr>
           <a:xfrm>
-            <a:off x="1257300" y="3606800"/>
-            <a:ext cx="1282700" cy="1498600"/>
+            <a:off x="1257300" y="-41136"/>
+            <a:ext cx="6807200" cy="6773169"/>
+            <a:chOff x="1257300" y="-41136"/>
+            <a:chExt cx="6807200" cy="6773169"/>
           </a:xfrm>
-          <a:prstGeom prst="rect">
-            <a:avLst/>
-          </a:prstGeom>
-          <a:solidFill>
-            <a:schemeClr val="bg1"/>
-          </a:solidFill>
-          <a:ln w="34925">
+        </p:grpSpPr>
+        <p:sp>
+          <p:nvSpPr>
+            <p:cNvPr id="5" name="Rectangle 4"/>
+            <p:cNvSpPr/>
+            <p:nvPr/>
+          </p:nvSpPr>
+          <p:spPr>
+            <a:xfrm>
+              <a:off x="1257300" y="3606800"/>
+              <a:ext cx="1282700" cy="1498600"/>
+            </a:xfrm>
+            <a:prstGeom prst="rect">
+              <a:avLst/>
+            </a:prstGeom>
             <a:solidFill>
-              <a:schemeClr val="tx1"/>
+              <a:schemeClr val="bg1"/>
             </a:solidFill>
-          </a:ln>
-        </p:spPr>
-        <p:style>
-          <a:lnRef idx="1">
-            <a:schemeClr val="accent1"/>
-          </a:lnRef>
-          <a:fillRef idx="3">
-            <a:schemeClr val="accent1"/>
-          </a:fillRef>
-          <a:effectRef idx="2">
-            <a:schemeClr val="accent1"/>
-          </a:effectRef>
-          <a:fontRef idx="minor">
-            <a:schemeClr val="lt1"/>
-          </a:fontRef>
-        </p:style>
-        <p:txBody>
-          <a:bodyPr rtlCol="0" anchor="ctr"/>
-          <a:lstStyle/>
-          <a:p>
-            <a:pPr algn="ctr"/>
-            <a:r>
-              <a:rPr lang="en-US" sz="1500" dirty="0" smtClean="0">
+            <a:ln w="34925">
+              <a:solidFill>
+                <a:schemeClr val="tx1"/>
+              </a:solidFill>
+            </a:ln>
+          </p:spPr>
+          <p:style>
+            <a:lnRef idx="1">
+              <a:schemeClr val="accent1"/>
+            </a:lnRef>
+            <a:fillRef idx="3">
+              <a:schemeClr val="accent1"/>
+            </a:fillRef>
+            <a:effectRef idx="2">
+              <a:schemeClr val="accent1"/>
+            </a:effectRef>
+            <a:fontRef idx="minor">
+              <a:schemeClr val="lt1"/>
+            </a:fontRef>
+          </p:style>
+          <p:txBody>
+            <a:bodyPr rtlCol="0" anchor="ctr"/>
+            <a:lstStyle/>
+            <a:p>
+              <a:pPr algn="ctr"/>
+              <a:r>
+                <a:rPr lang="en-US" sz="2100" b="1" dirty="0" smtClean="0">
+                  <a:solidFill>
+                    <a:schemeClr val="tx1"/>
+                  </a:solidFill>
+                  <a:latin typeface="Lucida Grande"/>
+                  <a:cs typeface="Lucida Grande"/>
+                </a:rPr>
+                <a:t>Stale View</a:t>
+              </a:r>
+            </a:p>
+            <a:p>
+              <a:pPr algn="ctr"/>
+              <a:endParaRPr lang="en-US" sz="2100" b="1" dirty="0">
                 <a:solidFill>
                   <a:schemeClr val="tx1"/>
                 </a:solidFill>
-                <a:latin typeface="Helvetica Light"/>
-                <a:cs typeface="Helvetica Light"/>
-              </a:rPr>
-              <a:t>Stale View</a:t>
-            </a:r>
-          </a:p>
-          <a:p>
-            <a:pPr algn="ctr"/>
-            <a:endParaRPr lang="en-US" sz="1500" dirty="0">
+                <a:latin typeface="Lucida Grande"/>
+                <a:cs typeface="Lucida Grande"/>
+              </a:endParaRPr>
+            </a:p>
+          </p:txBody>
+        </p:sp>
+        <p:sp>
+          <p:nvSpPr>
+            <p:cNvPr id="6" name="Rectangle 5"/>
+            <p:cNvSpPr/>
+            <p:nvPr/>
+          </p:nvSpPr>
+          <p:spPr>
+            <a:xfrm>
+              <a:off x="6781800" y="3606800"/>
+              <a:ext cx="1282700" cy="1498600"/>
+            </a:xfrm>
+            <a:prstGeom prst="rect">
+              <a:avLst/>
+            </a:prstGeom>
+            <a:solidFill>
+              <a:schemeClr val="bg1"/>
+            </a:solidFill>
+            <a:ln w="34925">
               <a:solidFill>
                 <a:schemeClr val="tx1"/>
               </a:solidFill>
-              <a:latin typeface="Helvetica Light"/>
-              <a:cs typeface="Helvetica Light"/>
-            </a:endParaRPr>
-          </a:p>
-        </p:txBody>
-      </p:sp>
-      <p:sp>
-        <p:nvSpPr>
-          <p:cNvPr id="6" name="Rectangle 5"/>
-          <p:cNvSpPr/>
-          <p:nvPr/>
-        </p:nvSpPr>
-        <p:spPr>
-          <a:xfrm>
-            <a:off x="6781800" y="3606800"/>
-            <a:ext cx="1282700" cy="1498600"/>
-          </a:xfrm>
-          <a:prstGeom prst="rect">
-            <a:avLst/>
-          </a:prstGeom>
-          <a:solidFill>
-            <a:schemeClr val="bg1"/>
-          </a:solidFill>
-          <a:ln w="34925">
-            <a:solidFill>
-              <a:schemeClr val="tx1"/>
-            </a:solidFill>
-          </a:ln>
-        </p:spPr>
-        <p:style>
-          <a:lnRef idx="1">
-            <a:schemeClr val="accent1"/>
-          </a:lnRef>
-          <a:fillRef idx="3">
-            <a:schemeClr val="accent1"/>
-          </a:fillRef>
-          <a:effectRef idx="2">
-            <a:schemeClr val="accent1"/>
-          </a:effectRef>
-          <a:fontRef idx="minor">
-            <a:schemeClr val="lt1"/>
-          </a:fontRef>
-        </p:style>
-        <p:txBody>
-          <a:bodyPr rtlCol="0" anchor="ctr"/>
-          <a:lstStyle/>
-          <a:p>
-            <a:pPr algn="ctr"/>
-            <a:r>
-              <a:rPr lang="en-US" sz="1500" dirty="0" smtClean="0">
+            </a:ln>
+          </p:spPr>
+          <p:style>
+            <a:lnRef idx="1">
+              <a:schemeClr val="accent1"/>
+            </a:lnRef>
+            <a:fillRef idx="3">
+              <a:schemeClr val="accent1"/>
+            </a:fillRef>
+            <a:effectRef idx="2">
+              <a:schemeClr val="accent1"/>
+            </a:effectRef>
+            <a:fontRef idx="minor">
+              <a:schemeClr val="lt1"/>
+            </a:fontRef>
+          </p:style>
+          <p:txBody>
+            <a:bodyPr rtlCol="0" anchor="ctr"/>
+            <a:lstStyle/>
+            <a:p>
+              <a:pPr algn="ctr"/>
+              <a:r>
+                <a:rPr lang="en-US" sz="2100" b="1" dirty="0" smtClean="0">
+                  <a:solidFill>
+                    <a:schemeClr val="tx1"/>
+                  </a:solidFill>
+                  <a:latin typeface="Lucida Grande"/>
+                  <a:cs typeface="Lucida Grande"/>
+                </a:rPr>
+                <a:t>Fresh View</a:t>
+              </a:r>
+            </a:p>
+            <a:p>
+              <a:pPr algn="ctr"/>
+              <a:endParaRPr lang="en-US" sz="2100" b="1" dirty="0">
                 <a:solidFill>
                   <a:schemeClr val="tx1"/>
                 </a:solidFill>
-                <a:latin typeface="Helvetica Light"/>
-                <a:cs typeface="Helvetica Light"/>
-              </a:rPr>
-              <a:t>Fresh View</a:t>
-            </a:r>
-          </a:p>
-          <a:p>
-            <a:pPr algn="ctr"/>
-            <a:endParaRPr lang="en-US" sz="1500" dirty="0">
+                <a:latin typeface="Lucida Grande"/>
+                <a:cs typeface="Lucida Grande"/>
+              </a:endParaRPr>
+            </a:p>
+          </p:txBody>
+        </p:sp>
+        <p:cxnSp>
+          <p:nvCxnSpPr>
+            <p:cNvPr id="8" name="Straight Arrow Connector 7"/>
+            <p:cNvCxnSpPr>
+              <a:stCxn id="5" idx="3"/>
+              <a:endCxn id="6" idx="1"/>
+            </p:cNvCxnSpPr>
+            <p:nvPr/>
+          </p:nvCxnSpPr>
+          <p:spPr>
+            <a:xfrm>
+              <a:off x="2540000" y="4356100"/>
+              <a:ext cx="4241800" cy="0"/>
+            </a:xfrm>
+            <a:prstGeom prst="straightConnector1">
+              <a:avLst/>
+            </a:prstGeom>
+            <a:ln w="50800">
               <a:solidFill>
                 <a:schemeClr val="tx1"/>
               </a:solidFill>
-              <a:latin typeface="Helvetica Light"/>
-              <a:cs typeface="Helvetica Light"/>
-            </a:endParaRPr>
-          </a:p>
-        </p:txBody>
-      </p:sp>
-      <p:cxnSp>
-        <p:nvCxnSpPr>
-          <p:cNvPr id="8" name="Straight Arrow Connector 7"/>
-          <p:cNvCxnSpPr>
-            <a:stCxn id="5" idx="3"/>
-            <a:endCxn id="6" idx="1"/>
-          </p:cNvCxnSpPr>
-          <p:nvPr/>
-        </p:nvCxnSpPr>
-        <p:spPr>
-          <a:xfrm>
-            <a:off x="2540000" y="4356100"/>
-            <a:ext cx="4241800" cy="0"/>
-          </a:xfrm>
-          <a:prstGeom prst="straightConnector1">
-            <a:avLst/>
-          </a:prstGeom>
-          <a:ln w="50800">
+              <a:tailEnd type="triangle"/>
+            </a:ln>
+          </p:spPr>
+          <p:style>
+            <a:lnRef idx="2">
+              <a:schemeClr val="accent1"/>
+            </a:lnRef>
+            <a:fillRef idx="0">
+              <a:schemeClr val="accent1"/>
+            </a:fillRef>
+            <a:effectRef idx="1">
+              <a:schemeClr val="accent1"/>
+            </a:effectRef>
+            <a:fontRef idx="minor">
+              <a:schemeClr val="tx1"/>
+            </a:fontRef>
+          </p:style>
+        </p:cxnSp>
+        <p:pic>
+          <p:nvPicPr>
+            <p:cNvPr id="10" name="Picture 9"/>
+            <p:cNvPicPr>
+              <a:picLocks noChangeAspect="1"/>
+            </p:cNvPicPr>
+            <p:nvPr/>
+          </p:nvPicPr>
+          <p:blipFill>
+            <a:blip r:embed="rId2"/>
+            <a:stretch>
+              <a:fillRect/>
+            </a:stretch>
+          </p:blipFill>
+          <p:spPr>
+            <a:xfrm>
+              <a:off x="4305300" y="3526564"/>
+              <a:ext cx="740636" cy="740636"/>
+            </a:xfrm>
+            <a:prstGeom prst="rect">
+              <a:avLst/>
+            </a:prstGeom>
+          </p:spPr>
+        </p:pic>
+        <p:sp>
+          <p:nvSpPr>
+            <p:cNvPr id="11" name="TextBox 10"/>
+            <p:cNvSpPr txBox="1"/>
+            <p:nvPr/>
+          </p:nvSpPr>
+          <p:spPr>
+            <a:xfrm>
+              <a:off x="3131477" y="4406900"/>
+              <a:ext cx="3135049" cy="738664"/>
+            </a:xfrm>
+            <a:prstGeom prst="rect">
+              <a:avLst/>
+            </a:prstGeom>
+            <a:noFill/>
+          </p:spPr>
+          <p:txBody>
+            <a:bodyPr wrap="none" rtlCol="0">
+              <a:spAutoFit/>
+            </a:bodyPr>
+            <a:lstStyle/>
+            <a:p>
+              <a:pPr algn="ctr"/>
+              <a:r>
+                <a:rPr lang="en-US" sz="2100" b="1" dirty="0" smtClean="0">
+                  <a:latin typeface="Lucida Grande"/>
+                  <a:cs typeface="Lucida Grande"/>
+                </a:rPr>
+                <a:t>Background</a:t>
+              </a:r>
+            </a:p>
+            <a:p>
+              <a:pPr algn="ctr"/>
+              <a:r>
+                <a:rPr lang="en-US" sz="2100" b="1" dirty="0" smtClean="0">
+                  <a:latin typeface="Lucida Grande"/>
+                  <a:cs typeface="Lucida Grande"/>
+                </a:rPr>
+                <a:t>Periodic Maintenance</a:t>
+              </a:r>
+              <a:endParaRPr lang="en-US" sz="2100" b="1" dirty="0">
+                <a:latin typeface="Lucida Grande"/>
+                <a:cs typeface="Lucida Grande"/>
+              </a:endParaRPr>
+            </a:p>
+          </p:txBody>
+        </p:sp>
+        <p:sp>
+          <p:nvSpPr>
+            <p:cNvPr id="15" name="Can 14"/>
+            <p:cNvSpPr/>
+            <p:nvPr/>
+          </p:nvSpPr>
+          <p:spPr>
+            <a:xfrm>
+              <a:off x="4374685" y="5677932"/>
+              <a:ext cx="601770" cy="800354"/>
+            </a:xfrm>
+            <a:prstGeom prst="can">
+              <a:avLst/>
+            </a:prstGeom>
             <a:solidFill>
+              <a:schemeClr val="bg1"/>
+            </a:solidFill>
+            <a:ln>
+              <a:solidFill>
+                <a:schemeClr val="tx1"/>
+              </a:solidFill>
+            </a:ln>
+          </p:spPr>
+          <p:style>
+            <a:lnRef idx="1">
+              <a:schemeClr val="accent1"/>
+            </a:lnRef>
+            <a:fillRef idx="3">
+              <a:schemeClr val="accent1"/>
+            </a:fillRef>
+            <a:effectRef idx="2">
+              <a:schemeClr val="accent1"/>
+            </a:effectRef>
+            <a:fontRef idx="minor">
+              <a:schemeClr val="lt1"/>
+            </a:fontRef>
+          </p:style>
+          <p:txBody>
+            <a:bodyPr rtlCol="0" anchor="ctr"/>
+            <a:lstStyle/>
+            <a:p>
+              <a:pPr algn="ctr"/>
+              <a:endParaRPr lang="en-US" sz="2100" b="1">
+                <a:latin typeface="Lucida Grande"/>
+                <a:cs typeface="Lucida Grande"/>
+              </a:endParaRPr>
+            </a:p>
+          </p:txBody>
+        </p:sp>
+        <p:sp>
+          <p:nvSpPr>
+            <p:cNvPr id="16" name="Can 15"/>
+            <p:cNvSpPr/>
+            <p:nvPr/>
+          </p:nvSpPr>
+          <p:spPr>
+            <a:xfrm>
+              <a:off x="3972199" y="5830332"/>
+              <a:ext cx="677971" cy="901701"/>
+            </a:xfrm>
+            <a:prstGeom prst="can">
+              <a:avLst/>
+            </a:prstGeom>
+            <a:solidFill>
+              <a:schemeClr val="bg1"/>
+            </a:solidFill>
+            <a:ln>
+              <a:solidFill>
+                <a:schemeClr val="tx1"/>
+              </a:solidFill>
+            </a:ln>
+          </p:spPr>
+          <p:style>
+            <a:lnRef idx="1">
+              <a:schemeClr val="accent1"/>
+            </a:lnRef>
+            <a:fillRef idx="3">
+              <a:schemeClr val="accent1"/>
+            </a:fillRef>
+            <a:effectRef idx="2">
+              <a:schemeClr val="accent1"/>
+            </a:effectRef>
+            <a:fontRef idx="minor">
+              <a:schemeClr val="lt1"/>
+            </a:fontRef>
+          </p:style>
+          <p:txBody>
+            <a:bodyPr rtlCol="0" anchor="ctr"/>
+            <a:lstStyle/>
+            <a:p>
+              <a:pPr algn="ctr"/>
+              <a:endParaRPr lang="en-US" sz="2100" b="1">
+                <a:latin typeface="Lucida Grande"/>
+                <a:cs typeface="Lucida Grande"/>
+              </a:endParaRPr>
+            </a:p>
+          </p:txBody>
+        </p:sp>
+        <p:sp>
+          <p:nvSpPr>
+            <p:cNvPr id="17" name="Can 16"/>
+            <p:cNvSpPr/>
+            <p:nvPr/>
+          </p:nvSpPr>
+          <p:spPr>
+            <a:xfrm>
+              <a:off x="4650170" y="5830333"/>
+              <a:ext cx="677970" cy="901700"/>
+            </a:xfrm>
+            <a:prstGeom prst="can">
+              <a:avLst/>
+            </a:prstGeom>
+            <a:solidFill>
+              <a:schemeClr val="bg1"/>
+            </a:solidFill>
+            <a:ln>
+              <a:solidFill>
+                <a:schemeClr val="tx1"/>
+              </a:solidFill>
+            </a:ln>
+          </p:spPr>
+          <p:style>
+            <a:lnRef idx="1">
+              <a:schemeClr val="accent1"/>
+            </a:lnRef>
+            <a:fillRef idx="3">
+              <a:schemeClr val="accent1"/>
+            </a:fillRef>
+            <a:effectRef idx="2">
+              <a:schemeClr val="accent1"/>
+            </a:effectRef>
+            <a:fontRef idx="minor">
+              <a:schemeClr val="lt1"/>
+            </a:fontRef>
+          </p:style>
+          <p:txBody>
+            <a:bodyPr rtlCol="0" anchor="ctr"/>
+            <a:lstStyle/>
+            <a:p>
+              <a:pPr algn="ctr"/>
+              <a:endParaRPr lang="en-US" sz="2100" b="1">
+                <a:latin typeface="Lucida Grande"/>
+                <a:cs typeface="Lucida Grande"/>
+              </a:endParaRPr>
+            </a:p>
+          </p:txBody>
+        </p:sp>
+        <p:sp>
+          <p:nvSpPr>
+            <p:cNvPr id="18" name="TextBox 17"/>
+            <p:cNvSpPr txBox="1"/>
+            <p:nvPr/>
+          </p:nvSpPr>
+          <p:spPr>
+            <a:xfrm>
+              <a:off x="3880767" y="6316535"/>
+              <a:ext cx="1550781" cy="415498"/>
+            </a:xfrm>
+            <a:prstGeom prst="rect">
+              <a:avLst/>
+            </a:prstGeom>
+            <a:solidFill>
+              <a:schemeClr val="bg1"/>
+            </a:solidFill>
+            <a:ln w="60325">
+              <a:solidFill>
+                <a:schemeClr val="tx1"/>
+              </a:solidFill>
+            </a:ln>
+          </p:spPr>
+          <p:txBody>
+            <a:bodyPr wrap="none" rtlCol="0">
+              <a:spAutoFit/>
+            </a:bodyPr>
+            <a:lstStyle/>
+            <a:p>
+              <a:r>
+                <a:rPr lang="en-US" sz="2100" b="1" dirty="0" smtClean="0">
+                  <a:latin typeface="Lucida Grande"/>
+                  <a:cs typeface="Lucida Grande"/>
+                </a:rPr>
+                <a:t>Base Data</a:t>
+              </a:r>
+              <a:endParaRPr lang="en-US" sz="2100" b="1" dirty="0">
+                <a:latin typeface="Lucida Grande"/>
+                <a:cs typeface="Lucida Grande"/>
+              </a:endParaRPr>
+            </a:p>
+          </p:txBody>
+        </p:sp>
+        <p:cxnSp>
+          <p:nvCxnSpPr>
+            <p:cNvPr id="20" name="Straight Arrow Connector 19"/>
+            <p:cNvCxnSpPr/>
+            <p:nvPr/>
+          </p:nvCxnSpPr>
+          <p:spPr>
+            <a:xfrm flipH="1" flipV="1">
+              <a:off x="1898650" y="5308600"/>
+              <a:ext cx="2073550" cy="724934"/>
+            </a:xfrm>
+            <a:prstGeom prst="straightConnector1">
+              <a:avLst/>
+            </a:prstGeom>
+            <a:ln w="50800">
+              <a:solidFill>
+                <a:schemeClr val="tx1"/>
+              </a:solidFill>
+              <a:prstDash val="sysDash"/>
+              <a:tailEnd type="arrow"/>
+            </a:ln>
+          </p:spPr>
+          <p:style>
+            <a:lnRef idx="2">
+              <a:schemeClr val="accent1"/>
+            </a:lnRef>
+            <a:fillRef idx="0">
+              <a:schemeClr val="accent1"/>
+            </a:fillRef>
+            <a:effectRef idx="1">
+              <a:schemeClr val="accent1"/>
+            </a:effectRef>
+            <a:fontRef idx="minor">
               <a:schemeClr val="tx1"/>
+            </a:fontRef>
+          </p:style>
+        </p:cxnSp>
+        <p:cxnSp>
+          <p:nvCxnSpPr>
+            <p:cNvPr id="21" name="Straight Arrow Connector 20"/>
+            <p:cNvCxnSpPr/>
+            <p:nvPr/>
+          </p:nvCxnSpPr>
+          <p:spPr>
+            <a:xfrm flipV="1">
+              <a:off x="5328140" y="5308600"/>
+              <a:ext cx="2095010" cy="724934"/>
+            </a:xfrm>
+            <a:prstGeom prst="straightConnector1">
+              <a:avLst/>
+            </a:prstGeom>
+            <a:ln w="50800">
+              <a:solidFill>
+                <a:schemeClr val="tx1"/>
+              </a:solidFill>
+              <a:prstDash val="sysDash"/>
+              <a:tailEnd type="arrow"/>
+            </a:ln>
+          </p:spPr>
+          <p:style>
+            <a:lnRef idx="2">
+              <a:schemeClr val="accent1"/>
+            </a:lnRef>
+            <a:fillRef idx="0">
+              <a:schemeClr val="accent1"/>
+            </a:fillRef>
+            <a:effectRef idx="1">
+              <a:schemeClr val="accent1"/>
+            </a:effectRef>
+            <a:fontRef idx="minor">
+              <a:schemeClr val="tx1"/>
+            </a:fontRef>
+          </p:style>
+        </p:cxnSp>
+        <p:sp>
+          <p:nvSpPr>
+            <p:cNvPr id="24" name="Rounded Rectangle 23"/>
+            <p:cNvSpPr/>
+            <p:nvPr/>
+          </p:nvSpPr>
+          <p:spPr>
+            <a:xfrm>
+              <a:off x="1257300" y="1244600"/>
+              <a:ext cx="6807200" cy="1930400"/>
+            </a:xfrm>
+            <a:prstGeom prst="roundRect">
+              <a:avLst/>
+            </a:prstGeom>
+            <a:solidFill>
+              <a:schemeClr val="bg1"/>
             </a:solidFill>
-            <a:tailEnd type="triangle"/>
-          </a:ln>
-        </p:spPr>
-        <p:style>
-          <a:lnRef idx="2">
-            <a:schemeClr val="accent1"/>
-          </a:lnRef>
-          <a:fillRef idx="0">
-            <a:schemeClr val="accent1"/>
-          </a:fillRef>
-          <a:effectRef idx="1">
-            <a:schemeClr val="accent1"/>
-          </a:effectRef>
-          <a:fontRef idx="minor">
-            <a:schemeClr val="tx1"/>
-          </a:fontRef>
-        </p:style>
-      </p:cxnSp>
-      <p:pic>
-        <p:nvPicPr>
-          <p:cNvPr id="10" name="Picture 9"/>
-          <p:cNvPicPr>
-            <a:picLocks noChangeAspect="1"/>
-          </p:cNvPicPr>
-          <p:nvPr/>
-        </p:nvPicPr>
-        <p:blipFill>
-          <a:blip r:embed="rId2"/>
-          <a:stretch>
-            <a:fillRect/>
-          </a:stretch>
-        </p:blipFill>
-        <p:spPr>
-          <a:xfrm>
-            <a:off x="4305300" y="3526564"/>
-            <a:ext cx="740636" cy="740636"/>
-          </a:xfrm>
-          <a:prstGeom prst="rect">
-            <a:avLst/>
-          </a:prstGeom>
-        </p:spPr>
-      </p:pic>
-      <p:sp>
-        <p:nvSpPr>
-          <p:cNvPr id="11" name="TextBox 10"/>
-          <p:cNvSpPr txBox="1"/>
-          <p:nvPr/>
-        </p:nvSpPr>
-        <p:spPr>
-          <a:xfrm>
-            <a:off x="3670515" y="4406900"/>
-            <a:ext cx="2056973" cy="553998"/>
-          </a:xfrm>
-          <a:prstGeom prst="rect">
-            <a:avLst/>
-          </a:prstGeom>
-          <a:noFill/>
-        </p:spPr>
-        <p:txBody>
-          <a:bodyPr wrap="none" rtlCol="0">
-            <a:spAutoFit/>
-          </a:bodyPr>
-          <a:lstStyle/>
-          <a:p>
-            <a:pPr algn="ctr"/>
-            <a:r>
-              <a:rPr lang="en-US" sz="1500" dirty="0" smtClean="0">
-                <a:latin typeface="Helvetica Light"/>
-                <a:cs typeface="Helvetica Light"/>
-              </a:rPr>
-              <a:t>Background</a:t>
-            </a:r>
-          </a:p>
-          <a:p>
-            <a:pPr algn="ctr"/>
-            <a:r>
-              <a:rPr lang="en-US" sz="1500" dirty="0" smtClean="0">
-                <a:latin typeface="Helvetica Light"/>
-                <a:cs typeface="Helvetica Light"/>
-              </a:rPr>
-              <a:t>Periodic Maintenance</a:t>
-            </a:r>
-            <a:endParaRPr lang="en-US" sz="1500" dirty="0">
-              <a:latin typeface="Helvetica Light"/>
-              <a:cs typeface="Helvetica Light"/>
-            </a:endParaRPr>
-          </a:p>
-        </p:txBody>
-      </p:sp>
-      <p:sp>
-        <p:nvSpPr>
-          <p:cNvPr id="15" name="Can 14"/>
-          <p:cNvSpPr/>
-          <p:nvPr/>
-        </p:nvSpPr>
-        <p:spPr>
-          <a:xfrm>
-            <a:off x="4374685" y="5677932"/>
-            <a:ext cx="601770" cy="800354"/>
-          </a:xfrm>
-          <a:prstGeom prst="can">
-            <a:avLst/>
-          </a:prstGeom>
-          <a:solidFill>
-            <a:schemeClr val="bg1"/>
-          </a:solidFill>
-          <a:ln>
+            <a:ln w="47625">
+              <a:solidFill>
+                <a:schemeClr val="tx1"/>
+              </a:solidFill>
+            </a:ln>
+          </p:spPr>
+          <p:style>
+            <a:lnRef idx="1">
+              <a:schemeClr val="accent1"/>
+            </a:lnRef>
+            <a:fillRef idx="3">
+              <a:schemeClr val="accent1"/>
+            </a:fillRef>
+            <a:effectRef idx="2">
+              <a:schemeClr val="accent1"/>
+            </a:effectRef>
+            <a:fontRef idx="minor">
+              <a:schemeClr val="lt1"/>
+            </a:fontRef>
+          </p:style>
+          <p:txBody>
+            <a:bodyPr rtlCol="0" anchor="ctr"/>
+            <a:lstStyle/>
+            <a:p>
+              <a:pPr algn="ctr"/>
+              <a:endParaRPr lang="en-US" sz="2100" b="1" dirty="0">
+                <a:latin typeface="Lucida Grande"/>
+                <a:cs typeface="Lucida Grande"/>
+              </a:endParaRPr>
+            </a:p>
+          </p:txBody>
+        </p:sp>
+        <p:sp>
+          <p:nvSpPr>
+            <p:cNvPr id="25" name="TextBox 24"/>
+            <p:cNvSpPr txBox="1"/>
+            <p:nvPr/>
+          </p:nvSpPr>
+          <p:spPr>
+            <a:xfrm>
+              <a:off x="1406207" y="1295400"/>
+              <a:ext cx="718541" cy="415498"/>
+            </a:xfrm>
+            <a:prstGeom prst="rect">
+              <a:avLst/>
+            </a:prstGeom>
+            <a:noFill/>
+          </p:spPr>
+          <p:txBody>
+            <a:bodyPr wrap="none" rtlCol="0">
+              <a:spAutoFit/>
+            </a:bodyPr>
+            <a:lstStyle/>
+            <a:p>
+              <a:r>
+                <a:rPr lang="en-US" sz="2100" b="1" dirty="0" smtClean="0">
+                  <a:latin typeface="Lucida Grande"/>
+                  <a:cs typeface="Lucida Grande"/>
+                </a:rPr>
+                <a:t>SVC</a:t>
+              </a:r>
+              <a:endParaRPr lang="en-US" sz="2100" b="1" dirty="0">
+                <a:latin typeface="Lucida Grande"/>
+                <a:cs typeface="Lucida Grande"/>
+              </a:endParaRPr>
+            </a:p>
+          </p:txBody>
+        </p:sp>
+        <p:cxnSp>
+          <p:nvCxnSpPr>
+            <p:cNvPr id="40" name="Straight Arrow Connector 39"/>
+            <p:cNvCxnSpPr>
+              <a:stCxn id="24" idx="1"/>
+              <a:endCxn id="24" idx="3"/>
+            </p:cNvCxnSpPr>
+            <p:nvPr/>
+          </p:nvCxnSpPr>
+          <p:spPr>
+            <a:xfrm>
+              <a:off x="1257300" y="2209800"/>
+              <a:ext cx="6807200" cy="0"/>
+            </a:xfrm>
+            <a:prstGeom prst="straightConnector1">
+              <a:avLst/>
+            </a:prstGeom>
+            <a:ln w="50800">
+              <a:solidFill>
+                <a:schemeClr val="tx1"/>
+              </a:solidFill>
+              <a:tailEnd type="arrow"/>
+            </a:ln>
+          </p:spPr>
+          <p:style>
+            <a:lnRef idx="2">
+              <a:schemeClr val="accent1"/>
+            </a:lnRef>
+            <a:fillRef idx="0">
+              <a:schemeClr val="accent1"/>
+            </a:fillRef>
+            <a:effectRef idx="1">
+              <a:schemeClr val="accent1"/>
+            </a:effectRef>
+            <a:fontRef idx="minor">
+              <a:schemeClr val="tx1"/>
+            </a:fontRef>
+          </p:style>
+        </p:cxnSp>
+        <p:cxnSp>
+          <p:nvCxnSpPr>
+            <p:cNvPr id="31" name="Elbow Connector 30"/>
+            <p:cNvCxnSpPr>
+              <a:stCxn id="16" idx="2"/>
+              <a:endCxn id="24" idx="1"/>
+            </p:cNvCxnSpPr>
+            <p:nvPr/>
+          </p:nvCxnSpPr>
+          <p:spPr>
+            <a:xfrm rot="10800000">
+              <a:off x="1257301" y="2209801"/>
+              <a:ext cx="2714899" cy="4071383"/>
+            </a:xfrm>
+            <a:prstGeom prst="bentConnector3">
+              <a:avLst>
+                <a:gd name="adj1" fmla="val 119627"/>
+              </a:avLst>
+            </a:prstGeom>
+            <a:ln w="50800">
+              <a:solidFill>
+                <a:schemeClr val="tx1"/>
+              </a:solidFill>
+              <a:prstDash val="sysDash"/>
+              <a:tailEnd type="arrow"/>
+            </a:ln>
+          </p:spPr>
+          <p:style>
+            <a:lnRef idx="2">
+              <a:schemeClr val="accent1"/>
+            </a:lnRef>
+            <a:fillRef idx="0">
+              <a:schemeClr val="accent1"/>
+            </a:fillRef>
+            <a:effectRef idx="1">
+              <a:schemeClr val="accent1"/>
+            </a:effectRef>
+            <a:fontRef idx="minor">
+              <a:schemeClr val="tx1"/>
+            </a:fontRef>
+          </p:style>
+        </p:cxnSp>
+        <p:sp>
+          <p:nvSpPr>
+            <p:cNvPr id="26" name="Rectangle 25"/>
+            <p:cNvSpPr/>
+            <p:nvPr/>
+          </p:nvSpPr>
+          <p:spPr>
+            <a:xfrm>
+              <a:off x="3476637" y="1892401"/>
+              <a:ext cx="2394351" cy="659808"/>
+            </a:xfrm>
+            <a:prstGeom prst="rect">
+              <a:avLst/>
+            </a:prstGeom>
             <a:solidFill>
+              <a:schemeClr val="bg1"/>
+            </a:solidFill>
+            <a:ln>
+              <a:solidFill>
+                <a:schemeClr val="tx1"/>
+              </a:solidFill>
+            </a:ln>
+          </p:spPr>
+          <p:style>
+            <a:lnRef idx="1">
+              <a:schemeClr val="accent1"/>
+            </a:lnRef>
+            <a:fillRef idx="3">
+              <a:schemeClr val="accent1"/>
+            </a:fillRef>
+            <a:effectRef idx="2">
+              <a:schemeClr val="accent1"/>
+            </a:effectRef>
+            <a:fontRef idx="minor">
+              <a:schemeClr val="lt1"/>
+            </a:fontRef>
+          </p:style>
+          <p:txBody>
+            <a:bodyPr rtlCol="0" anchor="ctr"/>
+            <a:lstStyle/>
+            <a:p>
+              <a:pPr algn="ctr"/>
+              <a:r>
+                <a:rPr lang="en-US" sz="2100" b="1" dirty="0" smtClean="0">
+                  <a:solidFill>
+                    <a:schemeClr val="tx1"/>
+                  </a:solidFill>
+                  <a:latin typeface="Lucida Grande"/>
+                  <a:cs typeface="Lucida Grande"/>
+                </a:rPr>
+                <a:t>Up-to-date</a:t>
+              </a:r>
+            </a:p>
+            <a:p>
+              <a:pPr algn="ctr"/>
+              <a:r>
+                <a:rPr lang="en-US" sz="2100" b="1" dirty="0" smtClean="0">
+                  <a:solidFill>
+                    <a:schemeClr val="tx1"/>
+                  </a:solidFill>
+                  <a:latin typeface="Lucida Grande"/>
+                  <a:cs typeface="Lucida Grande"/>
+                </a:rPr>
+                <a:t>Sample </a:t>
+              </a:r>
+              <a:r>
+                <a:rPr lang="en-US" sz="2100" b="1" dirty="0" smtClean="0">
+                  <a:solidFill>
+                    <a:schemeClr val="tx1"/>
+                  </a:solidFill>
+                  <a:latin typeface="Lucida Grande"/>
+                  <a:cs typeface="Lucida Grande"/>
+                </a:rPr>
+                <a:t>View</a:t>
+              </a:r>
+            </a:p>
+          </p:txBody>
+        </p:sp>
+        <p:sp>
+          <p:nvSpPr>
+            <p:cNvPr id="41" name="TextBox 40"/>
+            <p:cNvSpPr txBox="1"/>
+            <p:nvPr/>
+          </p:nvSpPr>
+          <p:spPr>
+            <a:xfrm>
+              <a:off x="2190888" y="2759502"/>
+              <a:ext cx="5298402" cy="415498"/>
+            </a:xfrm>
+            <a:prstGeom prst="rect">
+              <a:avLst/>
+            </a:prstGeom>
+            <a:noFill/>
+          </p:spPr>
+          <p:txBody>
+            <a:bodyPr wrap="square" rtlCol="0">
+              <a:spAutoFit/>
+            </a:bodyPr>
+            <a:lstStyle/>
+            <a:p>
+              <a:pPr algn="ctr"/>
+              <a:r>
+                <a:rPr lang="en-US" sz="2100" b="1" dirty="0" smtClean="0">
+                  <a:latin typeface="Lucida Grande"/>
+                  <a:cs typeface="Lucida Grande"/>
+                </a:rPr>
+                <a:t>Continuous</a:t>
+              </a:r>
+              <a:r>
+                <a:rPr lang="en-US" sz="2100" b="1" dirty="0">
+                  <a:latin typeface="Lucida Grande"/>
+                  <a:cs typeface="Lucida Grande"/>
+                </a:rPr>
+                <a:t> </a:t>
+              </a:r>
+              <a:r>
+                <a:rPr lang="en-US" sz="2100" b="1" dirty="0" smtClean="0">
+                  <a:latin typeface="Lucida Grande"/>
+                  <a:cs typeface="Lucida Grande"/>
+                </a:rPr>
+                <a:t>Sample </a:t>
+              </a:r>
+              <a:r>
+                <a:rPr lang="en-US" sz="2100" b="1" dirty="0" smtClean="0">
+                  <a:latin typeface="Lucida Grande"/>
+                  <a:cs typeface="Lucida Grande"/>
+                </a:rPr>
+                <a:t>Maintenance</a:t>
+              </a:r>
+              <a:endParaRPr lang="en-US" sz="2100" b="1" dirty="0">
+                <a:latin typeface="Lucida Grande"/>
+                <a:cs typeface="Lucida Grande"/>
+              </a:endParaRPr>
+            </a:p>
+          </p:txBody>
+        </p:sp>
+        <p:sp>
+          <p:nvSpPr>
+            <p:cNvPr id="42" name="TextBox 41"/>
+            <p:cNvSpPr txBox="1"/>
+            <p:nvPr/>
+          </p:nvSpPr>
+          <p:spPr>
+            <a:xfrm>
+              <a:off x="2729922" y="534601"/>
+              <a:ext cx="1020588" cy="415498"/>
+            </a:xfrm>
+            <a:prstGeom prst="rect">
+              <a:avLst/>
+            </a:prstGeom>
+            <a:noFill/>
+          </p:spPr>
+          <p:txBody>
+            <a:bodyPr wrap="none" rtlCol="0">
+              <a:spAutoFit/>
+            </a:bodyPr>
+            <a:lstStyle/>
+            <a:p>
+              <a:r>
+                <a:rPr lang="en-US" sz="2100" b="1" dirty="0" smtClean="0">
+                  <a:latin typeface="Lucida Grande"/>
+                  <a:cs typeface="Lucida Grande"/>
+                </a:rPr>
+                <a:t>Query</a:t>
+              </a:r>
+              <a:endParaRPr lang="en-US" sz="2100" b="1" dirty="0">
+                <a:latin typeface="Lucida Grande"/>
+                <a:cs typeface="Lucida Grande"/>
+              </a:endParaRPr>
+            </a:p>
+          </p:txBody>
+        </p:sp>
+        <p:cxnSp>
+          <p:nvCxnSpPr>
+            <p:cNvPr id="48" name="Straight Arrow Connector 47"/>
+            <p:cNvCxnSpPr/>
+            <p:nvPr/>
+          </p:nvCxnSpPr>
+          <p:spPr>
+            <a:xfrm>
+              <a:off x="3250919" y="950099"/>
+              <a:ext cx="1" cy="261203"/>
+            </a:xfrm>
+            <a:prstGeom prst="straightConnector1">
+              <a:avLst/>
+            </a:prstGeom>
+            <a:ln w="50800">
+              <a:solidFill>
+                <a:schemeClr val="tx1"/>
+              </a:solidFill>
+              <a:tailEnd type="triangle"/>
+            </a:ln>
+          </p:spPr>
+          <p:style>
+            <a:lnRef idx="2">
+              <a:schemeClr val="accent1"/>
+            </a:lnRef>
+            <a:fillRef idx="0">
+              <a:schemeClr val="accent1"/>
+            </a:fillRef>
+            <a:effectRef idx="1">
+              <a:schemeClr val="accent1"/>
+            </a:effectRef>
+            <a:fontRef idx="minor">
               <a:schemeClr val="tx1"/>
+            </a:fontRef>
+          </p:style>
+        </p:cxnSp>
+        <p:sp>
+          <p:nvSpPr>
+            <p:cNvPr id="52" name="TextBox 51"/>
+            <p:cNvSpPr txBox="1"/>
+            <p:nvPr/>
+          </p:nvSpPr>
+          <p:spPr>
+            <a:xfrm>
+              <a:off x="4893325" y="-41136"/>
+              <a:ext cx="2492057" cy="1061829"/>
+            </a:xfrm>
+            <a:prstGeom prst="rect">
+              <a:avLst/>
+            </a:prstGeom>
+            <a:noFill/>
+          </p:spPr>
+          <p:txBody>
+            <a:bodyPr wrap="square" rtlCol="0">
+              <a:spAutoFit/>
+            </a:bodyPr>
+            <a:lstStyle/>
+            <a:p>
+              <a:pPr algn="ctr"/>
+              <a:r>
+                <a:rPr lang="en-US" sz="2100" b="1" dirty="0" smtClean="0">
+                  <a:latin typeface="Lucida Grande"/>
+                  <a:cs typeface="Lucida Grande"/>
+                </a:rPr>
+                <a:t>Fresh</a:t>
+              </a:r>
+            </a:p>
+            <a:p>
+              <a:pPr algn="ctr"/>
+              <a:r>
+                <a:rPr lang="en-US" sz="2100" b="1" dirty="0" smtClean="0">
+                  <a:latin typeface="Lucida Grande"/>
+                  <a:cs typeface="Lucida Grande"/>
+                </a:rPr>
+                <a:t>Approximate </a:t>
+              </a:r>
+            </a:p>
+            <a:p>
+              <a:pPr algn="ctr"/>
+              <a:r>
+                <a:rPr lang="en-US" sz="2100" b="1" dirty="0" smtClean="0">
+                  <a:latin typeface="Lucida Grande"/>
+                  <a:cs typeface="Lucida Grande"/>
+                </a:rPr>
+                <a:t>Result</a:t>
+              </a:r>
+              <a:endParaRPr lang="en-US" sz="2100" b="1" dirty="0">
+                <a:latin typeface="Lucida Grande"/>
+                <a:cs typeface="Lucida Grande"/>
+              </a:endParaRPr>
+            </a:p>
+          </p:txBody>
+        </p:sp>
+        <p:cxnSp>
+          <p:nvCxnSpPr>
+            <p:cNvPr id="53" name="Straight Arrow Connector 52"/>
+            <p:cNvCxnSpPr/>
+            <p:nvPr/>
+          </p:nvCxnSpPr>
+          <p:spPr>
+            <a:xfrm flipV="1">
+              <a:off x="6148776" y="950099"/>
+              <a:ext cx="0" cy="261203"/>
+            </a:xfrm>
+            <a:prstGeom prst="straightConnector1">
+              <a:avLst/>
+            </a:prstGeom>
+            <a:ln w="50800">
+              <a:solidFill>
+                <a:schemeClr val="tx1"/>
+              </a:solidFill>
+              <a:tailEnd type="triangle"/>
+            </a:ln>
+          </p:spPr>
+          <p:style>
+            <a:lnRef idx="2">
+              <a:schemeClr val="accent1"/>
+            </a:lnRef>
+            <a:fillRef idx="0">
+              <a:schemeClr val="accent1"/>
+            </a:fillRef>
+            <a:effectRef idx="1">
+              <a:schemeClr val="accent1"/>
+            </a:effectRef>
+            <a:fontRef idx="minor">
+              <a:schemeClr val="tx1"/>
+            </a:fontRef>
+          </p:style>
+        </p:cxnSp>
+        <p:sp>
+          <p:nvSpPr>
+            <p:cNvPr id="61" name="Rectangle 60"/>
+            <p:cNvSpPr/>
+            <p:nvPr/>
+          </p:nvSpPr>
+          <p:spPr>
+            <a:xfrm>
+              <a:off x="3472722" y="1452730"/>
+              <a:ext cx="2398266" cy="439671"/>
+            </a:xfrm>
+            <a:prstGeom prst="rect">
+              <a:avLst/>
+            </a:prstGeom>
+            <a:solidFill>
+              <a:schemeClr val="bg1"/>
             </a:solidFill>
-          </a:ln>
-        </p:spPr>
-        <p:style>
-          <a:lnRef idx="1">
-            <a:schemeClr val="accent1"/>
-          </a:lnRef>
-          <a:fillRef idx="3">
-            <a:schemeClr val="accent1"/>
-          </a:fillRef>
-          <a:effectRef idx="2">
-            <a:schemeClr val="accent1"/>
-          </a:effectRef>
-          <a:fontRef idx="minor">
-            <a:schemeClr val="lt1"/>
-          </a:fontRef>
-        </p:style>
-        <p:txBody>
-          <a:bodyPr rtlCol="0" anchor="ctr"/>
-          <a:lstStyle/>
-          <a:p>
-            <a:pPr algn="ctr"/>
-            <a:endParaRPr lang="en-US" sz="1500">
-              <a:latin typeface="Helvetica Light"/>
-              <a:cs typeface="Helvetica Light"/>
-            </a:endParaRPr>
-          </a:p>
-        </p:txBody>
-      </p:sp>
-      <p:sp>
-        <p:nvSpPr>
-          <p:cNvPr id="16" name="Can 15"/>
-          <p:cNvSpPr/>
-          <p:nvPr/>
-        </p:nvSpPr>
-        <p:spPr>
-          <a:xfrm>
-            <a:off x="3972199" y="5830332"/>
-            <a:ext cx="677971" cy="901701"/>
-          </a:xfrm>
-          <a:prstGeom prst="can">
-            <a:avLst/>
-          </a:prstGeom>
-          <a:solidFill>
-            <a:schemeClr val="bg1"/>
-          </a:solidFill>
-          <a:ln>
-            <a:solidFill>
-              <a:schemeClr val="tx1"/>
-            </a:solidFill>
-          </a:ln>
-        </p:spPr>
-        <p:style>
-          <a:lnRef idx="1">
-            <a:schemeClr val="accent1"/>
-          </a:lnRef>
-          <a:fillRef idx="3">
-            <a:schemeClr val="accent1"/>
-          </a:fillRef>
-          <a:effectRef idx="2">
-            <a:schemeClr val="accent1"/>
-          </a:effectRef>
-          <a:fontRef idx="minor">
-            <a:schemeClr val="lt1"/>
-          </a:fontRef>
-        </p:style>
-        <p:txBody>
-          <a:bodyPr rtlCol="0" anchor="ctr"/>
-          <a:lstStyle/>
-          <a:p>
-            <a:pPr algn="ctr"/>
-            <a:endParaRPr lang="en-US" sz="1500">
-              <a:latin typeface="Helvetica Light"/>
-              <a:cs typeface="Helvetica Light"/>
-            </a:endParaRPr>
-          </a:p>
-        </p:txBody>
-      </p:sp>
-      <p:sp>
-        <p:nvSpPr>
-          <p:cNvPr id="17" name="Can 16"/>
-          <p:cNvSpPr/>
-          <p:nvPr/>
-        </p:nvSpPr>
-        <p:spPr>
-          <a:xfrm>
-            <a:off x="4650170" y="5830333"/>
-            <a:ext cx="677970" cy="901700"/>
-          </a:xfrm>
-          <a:prstGeom prst="can">
-            <a:avLst/>
-          </a:prstGeom>
-          <a:solidFill>
-            <a:schemeClr val="bg1"/>
-          </a:solidFill>
-          <a:ln>
-            <a:solidFill>
-              <a:schemeClr val="tx1"/>
-            </a:solidFill>
-          </a:ln>
-        </p:spPr>
-        <p:style>
-          <a:lnRef idx="1">
-            <a:schemeClr val="accent1"/>
-          </a:lnRef>
-          <a:fillRef idx="3">
-            <a:schemeClr val="accent1"/>
-          </a:fillRef>
-          <a:effectRef idx="2">
-            <a:schemeClr val="accent1"/>
-          </a:effectRef>
-          <a:fontRef idx="minor">
-            <a:schemeClr val="lt1"/>
-          </a:fontRef>
-        </p:style>
-        <p:txBody>
-          <a:bodyPr rtlCol="0" anchor="ctr"/>
-          <a:lstStyle/>
-          <a:p>
-            <a:pPr algn="ctr"/>
-            <a:endParaRPr lang="en-US" sz="1500">
-              <a:latin typeface="Helvetica Light"/>
-              <a:cs typeface="Helvetica Light"/>
-            </a:endParaRPr>
-          </a:p>
-        </p:txBody>
-      </p:sp>
-      <p:sp>
-        <p:nvSpPr>
-          <p:cNvPr id="18" name="TextBox 17"/>
-          <p:cNvSpPr txBox="1"/>
-          <p:nvPr/>
-        </p:nvSpPr>
-        <p:spPr>
-          <a:xfrm>
-            <a:off x="4223632" y="5308600"/>
-            <a:ext cx="1082792" cy="323165"/>
-          </a:xfrm>
-          <a:prstGeom prst="rect">
-            <a:avLst/>
-          </a:prstGeom>
-          <a:noFill/>
-        </p:spPr>
-        <p:txBody>
-          <a:bodyPr wrap="none" rtlCol="0">
-            <a:spAutoFit/>
-          </a:bodyPr>
-          <a:lstStyle/>
-          <a:p>
-            <a:r>
-              <a:rPr lang="en-US" sz="1500" dirty="0" smtClean="0">
-                <a:latin typeface="Helvetica Light"/>
-                <a:cs typeface="Helvetica Light"/>
-              </a:rPr>
-              <a:t>Base Data</a:t>
-            </a:r>
-            <a:endParaRPr lang="en-US" sz="1500" dirty="0">
-              <a:latin typeface="Helvetica Light"/>
-              <a:cs typeface="Helvetica Light"/>
-            </a:endParaRPr>
-          </a:p>
-        </p:txBody>
-      </p:sp>
-      <p:cxnSp>
-        <p:nvCxnSpPr>
-          <p:cNvPr id="20" name="Straight Arrow Connector 19"/>
-          <p:cNvCxnSpPr>
-            <a:endCxn id="5" idx="2"/>
-          </p:cNvCxnSpPr>
-          <p:nvPr/>
-        </p:nvCxnSpPr>
-        <p:spPr>
-          <a:xfrm flipH="1" flipV="1">
-            <a:off x="1898650" y="5105400"/>
-            <a:ext cx="2073549" cy="928133"/>
-          </a:xfrm>
-          <a:prstGeom prst="straightConnector1">
-            <a:avLst/>
-          </a:prstGeom>
-          <a:ln>
-            <a:solidFill>
-              <a:schemeClr val="tx1"/>
-            </a:solidFill>
-            <a:prstDash val="sysDash"/>
-            <a:tailEnd type="arrow"/>
-          </a:ln>
-        </p:spPr>
-        <p:style>
-          <a:lnRef idx="2">
-            <a:schemeClr val="accent1"/>
-          </a:lnRef>
-          <a:fillRef idx="0">
-            <a:schemeClr val="accent1"/>
-          </a:fillRef>
-          <a:effectRef idx="1">
-            <a:schemeClr val="accent1"/>
-          </a:effectRef>
-          <a:fontRef idx="minor">
-            <a:schemeClr val="tx1"/>
-          </a:fontRef>
-        </p:style>
-      </p:cxnSp>
-      <p:cxnSp>
-        <p:nvCxnSpPr>
-          <p:cNvPr id="21" name="Straight Arrow Connector 20"/>
-          <p:cNvCxnSpPr>
-            <a:endCxn id="6" idx="2"/>
-          </p:cNvCxnSpPr>
-          <p:nvPr/>
-        </p:nvCxnSpPr>
-        <p:spPr>
-          <a:xfrm flipV="1">
-            <a:off x="5328140" y="5105400"/>
-            <a:ext cx="2095010" cy="928133"/>
-          </a:xfrm>
-          <a:prstGeom prst="straightConnector1">
-            <a:avLst/>
-          </a:prstGeom>
-          <a:ln>
-            <a:solidFill>
-              <a:schemeClr val="tx1"/>
-            </a:solidFill>
-            <a:prstDash val="sysDash"/>
-            <a:tailEnd type="arrow"/>
-          </a:ln>
-        </p:spPr>
-        <p:style>
-          <a:lnRef idx="2">
-            <a:schemeClr val="accent1"/>
-          </a:lnRef>
-          <a:fillRef idx="0">
-            <a:schemeClr val="accent1"/>
-          </a:fillRef>
-          <a:effectRef idx="1">
-            <a:schemeClr val="accent1"/>
-          </a:effectRef>
-          <a:fontRef idx="minor">
-            <a:schemeClr val="tx1"/>
-          </a:fontRef>
-        </p:style>
-      </p:cxnSp>
-      <p:sp>
-        <p:nvSpPr>
-          <p:cNvPr id="24" name="Rounded Rectangle 23"/>
-          <p:cNvSpPr/>
-          <p:nvPr/>
-        </p:nvSpPr>
-        <p:spPr>
-          <a:xfrm>
-            <a:off x="1257300" y="1244600"/>
-            <a:ext cx="6807200" cy="1930400"/>
-          </a:xfrm>
-          <a:prstGeom prst="roundRect">
-            <a:avLst/>
-          </a:prstGeom>
-          <a:solidFill>
-            <a:schemeClr val="bg1"/>
-          </a:solidFill>
-          <a:ln w="47625">
-            <a:solidFill>
-              <a:schemeClr val="tx1"/>
-            </a:solidFill>
-          </a:ln>
-        </p:spPr>
-        <p:style>
-          <a:lnRef idx="1">
-            <a:schemeClr val="accent1"/>
-          </a:lnRef>
-          <a:fillRef idx="3">
-            <a:schemeClr val="accent1"/>
-          </a:fillRef>
-          <a:effectRef idx="2">
-            <a:schemeClr val="accent1"/>
-          </a:effectRef>
-          <a:fontRef idx="minor">
-            <a:schemeClr val="lt1"/>
-          </a:fontRef>
-        </p:style>
-        <p:txBody>
-          <a:bodyPr rtlCol="0" anchor="ctr"/>
-          <a:lstStyle/>
-          <a:p>
-            <a:pPr algn="ctr"/>
-            <a:endParaRPr lang="en-US" sz="1500" dirty="0">
-              <a:latin typeface="Helvetica Light"/>
-              <a:cs typeface="Helvetica Light"/>
-            </a:endParaRPr>
-          </a:p>
-        </p:txBody>
-      </p:sp>
-      <p:sp>
-        <p:nvSpPr>
-          <p:cNvPr id="25" name="TextBox 24"/>
-          <p:cNvSpPr txBox="1"/>
-          <p:nvPr/>
-        </p:nvSpPr>
-        <p:spPr>
-          <a:xfrm>
-            <a:off x="1406207" y="1295400"/>
-            <a:ext cx="558609" cy="323165"/>
-          </a:xfrm>
-          <a:prstGeom prst="rect">
-            <a:avLst/>
-          </a:prstGeom>
-          <a:noFill/>
-        </p:spPr>
-        <p:txBody>
-          <a:bodyPr wrap="none" rtlCol="0">
-            <a:spAutoFit/>
-          </a:bodyPr>
-          <a:lstStyle/>
-          <a:p>
-            <a:r>
-              <a:rPr lang="en-US" sz="1500" dirty="0" smtClean="0">
-                <a:latin typeface="Helvetica Light"/>
-                <a:cs typeface="Helvetica Light"/>
-              </a:rPr>
-              <a:t>SVC</a:t>
-            </a:r>
-            <a:endParaRPr lang="en-US" sz="1500" dirty="0">
-              <a:latin typeface="Helvetica Light"/>
-              <a:cs typeface="Helvetica Light"/>
-            </a:endParaRPr>
-          </a:p>
-        </p:txBody>
-      </p:sp>
-      <p:cxnSp>
-        <p:nvCxnSpPr>
-          <p:cNvPr id="40" name="Straight Arrow Connector 39"/>
-          <p:cNvCxnSpPr>
-            <a:stCxn id="24" idx="1"/>
-            <a:endCxn id="24" idx="3"/>
-          </p:cNvCxnSpPr>
-          <p:nvPr/>
-        </p:nvCxnSpPr>
-        <p:spPr>
-          <a:xfrm>
-            <a:off x="1257300" y="2209800"/>
-            <a:ext cx="6807200" cy="0"/>
-          </a:xfrm>
-          <a:prstGeom prst="straightConnector1">
-            <a:avLst/>
-          </a:prstGeom>
-          <a:ln w="50800">
-            <a:solidFill>
-              <a:schemeClr val="tx1"/>
-            </a:solidFill>
-            <a:tailEnd type="arrow"/>
-          </a:ln>
-        </p:spPr>
-        <p:style>
-          <a:lnRef idx="2">
-            <a:schemeClr val="accent1"/>
-          </a:lnRef>
-          <a:fillRef idx="0">
-            <a:schemeClr val="accent1"/>
-          </a:fillRef>
-          <a:effectRef idx="1">
-            <a:schemeClr val="accent1"/>
-          </a:effectRef>
-          <a:fontRef idx="minor">
-            <a:schemeClr val="tx1"/>
-          </a:fontRef>
-        </p:style>
-      </p:cxnSp>
-      <p:cxnSp>
-        <p:nvCxnSpPr>
-          <p:cNvPr id="31" name="Elbow Connector 30"/>
-          <p:cNvCxnSpPr>
-            <a:stCxn id="16" idx="2"/>
-            <a:endCxn id="24" idx="1"/>
-          </p:cNvCxnSpPr>
-          <p:nvPr/>
-        </p:nvCxnSpPr>
-        <p:spPr>
-          <a:xfrm rot="10800000">
-            <a:off x="1257301" y="2209801"/>
-            <a:ext cx="2714899" cy="4071383"/>
-          </a:xfrm>
-          <a:prstGeom prst="bentConnector3">
-            <a:avLst>
-              <a:gd name="adj1" fmla="val 108420"/>
-            </a:avLst>
-          </a:prstGeom>
-          <a:ln>
-            <a:solidFill>
-              <a:schemeClr val="tx1"/>
-            </a:solidFill>
-            <a:prstDash val="sysDash"/>
-            <a:tailEnd type="arrow"/>
-          </a:ln>
-        </p:spPr>
-        <p:style>
-          <a:lnRef idx="2">
-            <a:schemeClr val="accent1"/>
-          </a:lnRef>
-          <a:fillRef idx="0">
-            <a:schemeClr val="accent1"/>
-          </a:fillRef>
-          <a:effectRef idx="1">
-            <a:schemeClr val="accent1"/>
-          </a:effectRef>
-          <a:fontRef idx="minor">
-            <a:schemeClr val="tx1"/>
-          </a:fontRef>
-        </p:style>
-      </p:cxnSp>
-      <p:sp>
-        <p:nvSpPr>
-          <p:cNvPr id="26" name="Rectangle 25"/>
-          <p:cNvSpPr/>
-          <p:nvPr/>
-        </p:nvSpPr>
-        <p:spPr>
-          <a:xfrm>
-            <a:off x="4032740" y="1828800"/>
-            <a:ext cx="1282700" cy="558801"/>
-          </a:xfrm>
-          <a:prstGeom prst="rect">
-            <a:avLst/>
-          </a:prstGeom>
-          <a:solidFill>
-            <a:schemeClr val="bg1"/>
-          </a:solidFill>
-          <a:ln>
-            <a:solidFill>
-              <a:schemeClr val="tx1"/>
-            </a:solidFill>
-          </a:ln>
-        </p:spPr>
-        <p:style>
-          <a:lnRef idx="1">
-            <a:schemeClr val="accent1"/>
-          </a:lnRef>
-          <a:fillRef idx="3">
-            <a:schemeClr val="accent1"/>
-          </a:fillRef>
-          <a:effectRef idx="2">
-            <a:schemeClr val="accent1"/>
-          </a:effectRef>
-          <a:fontRef idx="minor">
-            <a:schemeClr val="lt1"/>
-          </a:fontRef>
-        </p:style>
-        <p:txBody>
-          <a:bodyPr rtlCol="0" anchor="ctr"/>
-          <a:lstStyle/>
-          <a:p>
-            <a:pPr algn="ctr"/>
-            <a:r>
-              <a:rPr lang="en-US" sz="1500" dirty="0" smtClean="0">
-                <a:solidFill>
-                  <a:schemeClr val="tx1"/>
-                </a:solidFill>
-                <a:latin typeface="Helvetica Light"/>
-                <a:cs typeface="Helvetica Light"/>
-              </a:rPr>
-              <a:t>Fresh</a:t>
-            </a:r>
-          </a:p>
-          <a:p>
-            <a:pPr algn="ctr"/>
-            <a:r>
-              <a:rPr lang="en-US" sz="1500" dirty="0" smtClean="0">
-                <a:solidFill>
-                  <a:schemeClr val="tx1"/>
-                </a:solidFill>
-                <a:latin typeface="Helvetica Light"/>
-                <a:cs typeface="Helvetica Light"/>
-              </a:rPr>
-              <a:t>Sample View</a:t>
-            </a:r>
-          </a:p>
-        </p:txBody>
-      </p:sp>
-      <p:sp>
-        <p:nvSpPr>
-          <p:cNvPr id="41" name="TextBox 40"/>
-          <p:cNvSpPr txBox="1"/>
-          <p:nvPr/>
-        </p:nvSpPr>
-        <p:spPr>
-          <a:xfrm>
-            <a:off x="3675161" y="2364938"/>
-            <a:ext cx="2002074" cy="553998"/>
-          </a:xfrm>
-          <a:prstGeom prst="rect">
-            <a:avLst/>
-          </a:prstGeom>
-          <a:noFill/>
-        </p:spPr>
-        <p:txBody>
-          <a:bodyPr wrap="none" rtlCol="0">
-            <a:spAutoFit/>
-          </a:bodyPr>
-          <a:lstStyle/>
-          <a:p>
-            <a:pPr algn="ctr"/>
-            <a:r>
-              <a:rPr lang="en-US" sz="1500" dirty="0" smtClean="0">
-                <a:latin typeface="Helvetica Light"/>
-                <a:cs typeface="Helvetica Light"/>
-              </a:rPr>
-              <a:t>Real-time Efficient </a:t>
-            </a:r>
-          </a:p>
-          <a:p>
-            <a:pPr algn="ctr"/>
-            <a:r>
-              <a:rPr lang="en-US" sz="1500" dirty="0" smtClean="0">
-                <a:latin typeface="Helvetica Light"/>
-                <a:cs typeface="Helvetica Light"/>
-              </a:rPr>
-              <a:t>Sample Maintenance</a:t>
-            </a:r>
-            <a:endParaRPr lang="en-US" sz="1500" dirty="0">
-              <a:latin typeface="Helvetica Light"/>
-              <a:cs typeface="Helvetica Light"/>
-            </a:endParaRPr>
-          </a:p>
-        </p:txBody>
-      </p:sp>
-      <p:sp>
-        <p:nvSpPr>
-          <p:cNvPr id="42" name="TextBox 41"/>
-          <p:cNvSpPr txBox="1"/>
-          <p:nvPr/>
-        </p:nvSpPr>
-        <p:spPr>
-          <a:xfrm>
-            <a:off x="3754425" y="578703"/>
-            <a:ext cx="710451" cy="323165"/>
-          </a:xfrm>
-          <a:prstGeom prst="rect">
-            <a:avLst/>
-          </a:prstGeom>
-          <a:noFill/>
-        </p:spPr>
-        <p:txBody>
-          <a:bodyPr wrap="none" rtlCol="0">
-            <a:spAutoFit/>
-          </a:bodyPr>
-          <a:lstStyle/>
-          <a:p>
-            <a:r>
-              <a:rPr lang="en-US" sz="1500" dirty="0" smtClean="0">
-                <a:latin typeface="Helvetica Light"/>
-                <a:cs typeface="Helvetica Light"/>
-              </a:rPr>
-              <a:t>Query</a:t>
-            </a:r>
-            <a:endParaRPr lang="en-US" sz="1500" dirty="0">
-              <a:latin typeface="Helvetica Light"/>
-              <a:cs typeface="Helvetica Light"/>
-            </a:endParaRPr>
-          </a:p>
-        </p:txBody>
-      </p:sp>
-      <p:cxnSp>
-        <p:nvCxnSpPr>
-          <p:cNvPr id="48" name="Straight Arrow Connector 47"/>
-          <p:cNvCxnSpPr/>
-          <p:nvPr/>
-        </p:nvCxnSpPr>
-        <p:spPr>
-          <a:xfrm>
-            <a:off x="4071068" y="950099"/>
-            <a:ext cx="1" cy="261203"/>
-          </a:xfrm>
-          <a:prstGeom prst="straightConnector1">
-            <a:avLst/>
-          </a:prstGeom>
-          <a:ln w="50800">
-            <a:solidFill>
-              <a:schemeClr val="tx1"/>
-            </a:solidFill>
-            <a:tailEnd type="triangle"/>
-          </a:ln>
-        </p:spPr>
-        <p:style>
-          <a:lnRef idx="2">
-            <a:schemeClr val="accent1"/>
-          </a:lnRef>
-          <a:fillRef idx="0">
-            <a:schemeClr val="accent1"/>
-          </a:fillRef>
-          <a:effectRef idx="1">
-            <a:schemeClr val="accent1"/>
-          </a:effectRef>
-          <a:fontRef idx="minor">
-            <a:schemeClr val="tx1"/>
-          </a:fontRef>
-        </p:style>
-      </p:cxnSp>
-      <p:sp>
-        <p:nvSpPr>
-          <p:cNvPr id="52" name="TextBox 51"/>
-          <p:cNvSpPr txBox="1"/>
-          <p:nvPr/>
-        </p:nvSpPr>
-        <p:spPr>
-          <a:xfrm>
-            <a:off x="4629658" y="105437"/>
-            <a:ext cx="1287532" cy="784830"/>
-          </a:xfrm>
-          <a:prstGeom prst="rect">
-            <a:avLst/>
-          </a:prstGeom>
-          <a:noFill/>
-        </p:spPr>
-        <p:txBody>
-          <a:bodyPr wrap="none" rtlCol="0">
-            <a:spAutoFit/>
-          </a:bodyPr>
-          <a:lstStyle/>
-          <a:p>
-            <a:pPr algn="ctr"/>
-            <a:r>
-              <a:rPr lang="en-US" sz="1500" dirty="0" smtClean="0">
-                <a:latin typeface="Helvetica Light"/>
-                <a:cs typeface="Helvetica Light"/>
-              </a:rPr>
-              <a:t>Fresh</a:t>
-            </a:r>
-          </a:p>
-          <a:p>
-            <a:pPr algn="ctr"/>
-            <a:r>
-              <a:rPr lang="en-US" sz="1500" dirty="0" smtClean="0">
-                <a:latin typeface="Helvetica Light"/>
-                <a:cs typeface="Helvetica Light"/>
-              </a:rPr>
-              <a:t>Approximate </a:t>
-            </a:r>
-          </a:p>
-          <a:p>
-            <a:pPr algn="ctr"/>
-            <a:r>
-              <a:rPr lang="en-US" sz="1500" dirty="0" smtClean="0">
-                <a:latin typeface="Helvetica Light"/>
-                <a:cs typeface="Helvetica Light"/>
-              </a:rPr>
-              <a:t>Result</a:t>
-            </a:r>
-            <a:endParaRPr lang="en-US" sz="1500" dirty="0">
-              <a:latin typeface="Helvetica Light"/>
-              <a:cs typeface="Helvetica Light"/>
-            </a:endParaRPr>
-          </a:p>
-        </p:txBody>
-      </p:sp>
-      <p:cxnSp>
-        <p:nvCxnSpPr>
-          <p:cNvPr id="53" name="Straight Arrow Connector 52"/>
-          <p:cNvCxnSpPr/>
-          <p:nvPr/>
-        </p:nvCxnSpPr>
-        <p:spPr>
-          <a:xfrm flipV="1">
-            <a:off x="5273425" y="962799"/>
-            <a:ext cx="0" cy="261203"/>
-          </a:xfrm>
-          <a:prstGeom prst="straightConnector1">
-            <a:avLst/>
-          </a:prstGeom>
-          <a:ln w="50800">
-            <a:solidFill>
-              <a:schemeClr val="tx1"/>
-            </a:solidFill>
-            <a:tailEnd type="triangle"/>
-          </a:ln>
-        </p:spPr>
-        <p:style>
-          <a:lnRef idx="2">
-            <a:schemeClr val="accent1"/>
-          </a:lnRef>
-          <a:fillRef idx="0">
-            <a:schemeClr val="accent1"/>
-          </a:fillRef>
-          <a:effectRef idx="1">
-            <a:schemeClr val="accent1"/>
-          </a:effectRef>
-          <a:fontRef idx="minor">
-            <a:schemeClr val="tx1"/>
-          </a:fontRef>
-        </p:style>
-      </p:cxnSp>
-      <p:sp>
-        <p:nvSpPr>
-          <p:cNvPr id="61" name="Rectangle 60"/>
-          <p:cNvSpPr/>
-          <p:nvPr/>
-        </p:nvSpPr>
-        <p:spPr>
-          <a:xfrm>
-            <a:off x="4028825" y="1512331"/>
-            <a:ext cx="1282700" cy="316469"/>
-          </a:xfrm>
-          <a:prstGeom prst="rect">
-            <a:avLst/>
-          </a:prstGeom>
-          <a:solidFill>
-            <a:schemeClr val="bg1"/>
-          </a:solidFill>
-          <a:ln>
-            <a:solidFill>
-              <a:schemeClr val="tx1"/>
-            </a:solidFill>
-          </a:ln>
-        </p:spPr>
-        <p:style>
-          <a:lnRef idx="1">
-            <a:schemeClr val="accent1"/>
-          </a:lnRef>
-          <a:fillRef idx="3">
-            <a:schemeClr val="accent1"/>
-          </a:fillRef>
-          <a:effectRef idx="2">
-            <a:schemeClr val="accent1"/>
-          </a:effectRef>
-          <a:fontRef idx="minor">
-            <a:schemeClr val="lt1"/>
-          </a:fontRef>
-        </p:style>
-        <p:txBody>
-          <a:bodyPr rtlCol="0" anchor="ctr"/>
-          <a:lstStyle/>
-          <a:p>
-            <a:pPr algn="ctr"/>
-            <a:r>
-              <a:rPr lang="en-US" sz="1500" dirty="0" smtClean="0">
-                <a:solidFill>
-                  <a:schemeClr val="tx1"/>
-                </a:solidFill>
-                <a:latin typeface="Helvetica Light"/>
-                <a:cs typeface="Helvetica Light"/>
-              </a:rPr>
-              <a:t>Outlier Index</a:t>
-            </a:r>
-          </a:p>
-        </p:txBody>
-      </p:sp>
+            <a:ln>
+              <a:solidFill>
+                <a:schemeClr val="tx1"/>
+              </a:solidFill>
+            </a:ln>
+          </p:spPr>
+          <p:style>
+            <a:lnRef idx="1">
+              <a:schemeClr val="accent1"/>
+            </a:lnRef>
+            <a:fillRef idx="3">
+              <a:schemeClr val="accent1"/>
+            </a:fillRef>
+            <a:effectRef idx="2">
+              <a:schemeClr val="accent1"/>
+            </a:effectRef>
+            <a:fontRef idx="minor">
+              <a:schemeClr val="lt1"/>
+            </a:fontRef>
+          </p:style>
+          <p:txBody>
+            <a:bodyPr rtlCol="0" anchor="ctr"/>
+            <a:lstStyle/>
+            <a:p>
+              <a:pPr algn="ctr"/>
+              <a:r>
+                <a:rPr lang="en-US" sz="2100" b="1" dirty="0" smtClean="0">
+                  <a:solidFill>
+                    <a:schemeClr val="tx1"/>
+                  </a:solidFill>
+                  <a:latin typeface="Lucida Grande"/>
+                  <a:cs typeface="Lucida Grande"/>
+                </a:rPr>
+                <a:t>Outlier Index</a:t>
+              </a:r>
+            </a:p>
+          </p:txBody>
+        </p:sp>
+      </p:grpSp>
     </p:spTree>
     <p:extLst>
       <p:ext uri="{BB962C8B-B14F-4D97-AF65-F5344CB8AC3E}">

</xml_diff>

<commit_message>
Updates based on the reviews
</commit_message>
<xml_diff>
--- a/figs/sys-arch.pptx
+++ b/figs/sys-arch.pptx
@@ -4523,6 +4523,16 @@
           <p:txBody>
             <a:bodyPr rtlCol="0" anchor="ctr"/>
             <a:lstStyle/>
+            <a:p>
+              <a:pPr algn="ctr"/>
+              <a:endParaRPr lang="en-US" sz="2100" b="1" dirty="0" smtClean="0">
+                <a:solidFill>
+                  <a:schemeClr val="tx1"/>
+                </a:solidFill>
+                <a:latin typeface="Lucida Grande"/>
+                <a:cs typeface="Lucida Grande"/>
+              </a:endParaRPr>
+            </a:p>
             <a:p>
               <a:pPr algn="ctr"/>
               <a:r>

</xml_diff>